<commit_message>
updated EDA power point
</commit_message>
<xml_diff>
--- a/presentation/DS6306_Proj1_Presentation.pptx
+++ b/presentation/DS6306_Proj1_Presentation.pptx
@@ -2667,10 +2667,10 @@
       </p:sp>
       <p:pic>
         <p:nvPicPr>
-          <p:cNvPr id="6" name="Picture 5">
+          <p:cNvPr id="4" name="Picture 3" descr="A screenshot of a computer&#10;&#10;Description automatically generated">
             <a:extLst>
               <a:ext uri="{FF2B5EF4-FFF2-40B4-BE49-F238E27FC236}">
-                <a16:creationId xmlns:a16="http://schemas.microsoft.com/office/drawing/2014/main" id="{04FEE896-9372-4CA9-8816-0342C2062C9B}"/>
+                <a16:creationId xmlns:a16="http://schemas.microsoft.com/office/drawing/2014/main" id="{03FD9F28-5C08-45E2-8A9C-1AB2DC431109}"/>
               </a:ext>
             </a:extLst>
           </p:cNvPr>
@@ -2687,8 +2687,38 @@
         </p:blipFill>
         <p:spPr>
           <a:xfrm>
-            <a:off x="719137" y="2749345"/>
-            <a:ext cx="7705725" cy="2819400"/>
+            <a:off x="190648" y="2943679"/>
+            <a:ext cx="4160125" cy="2567391"/>
+          </a:xfrm>
+          <a:prstGeom prst="rect">
+            <a:avLst/>
+          </a:prstGeom>
+        </p:spPr>
+      </p:pic>
+      <p:pic>
+        <p:nvPicPr>
+          <p:cNvPr id="8" name="Picture 7">
+            <a:extLst>
+              <a:ext uri="{FF2B5EF4-FFF2-40B4-BE49-F238E27FC236}">
+                <a16:creationId xmlns:a16="http://schemas.microsoft.com/office/drawing/2014/main" id="{953E4D53-5052-45F4-BE2B-D800A5E5CE4B}"/>
+              </a:ext>
+            </a:extLst>
+          </p:cNvPr>
+          <p:cNvPicPr>
+            <a:picLocks noChangeAspect="1"/>
+          </p:cNvPicPr>
+          <p:nvPr/>
+        </p:nvPicPr>
+        <p:blipFill>
+          <a:blip r:embed="rId3"/>
+          <a:stretch>
+            <a:fillRect/>
+          </a:stretch>
+        </p:blipFill>
+        <p:spPr>
+          <a:xfrm>
+            <a:off x="4793224" y="2939913"/>
+            <a:ext cx="4160126" cy="2567392"/>
           </a:xfrm>
           <a:prstGeom prst="rect">
             <a:avLst/>
@@ -3515,12 +3545,52 @@
           </a:p>
         </p:txBody>
       </p:sp>
+      <p:sp>
+        <p:nvSpPr>
+          <p:cNvPr id="4" name="Rectangle 3">
+            <a:extLst>
+              <a:ext uri="{FF2B5EF4-FFF2-40B4-BE49-F238E27FC236}">
+                <a16:creationId xmlns:a16="http://schemas.microsoft.com/office/drawing/2014/main" id="{6608DBBE-C619-4CEB-9667-544ECD27A105}"/>
+              </a:ext>
+            </a:extLst>
+          </p:cNvPr>
+          <p:cNvSpPr/>
+          <p:nvPr/>
+        </p:nvSpPr>
+        <p:spPr>
+          <a:xfrm>
+            <a:off x="207115" y="5616258"/>
+            <a:ext cx="9062884" cy="923330"/>
+          </a:xfrm>
+          <a:prstGeom prst="rect">
+            <a:avLst/>
+          </a:prstGeom>
+        </p:spPr>
+        <p:txBody>
+          <a:bodyPr wrap="square">
+            <a:spAutoFit/>
+          </a:bodyPr>
+          <a:lstStyle/>
+          <a:p>
+            <a:r>
+              <a:rPr lang="en-US" i="1" dirty="0"/>
+              <a:t>From visually inspecting the graph, most states have a relatively close spread.  The summary statistics show that 50% of the available data fall within the interval </a:t>
+            </a:r>
+          </a:p>
+          <a:p>
+            <a:r>
+              <a:rPr lang="en-US" i="1" dirty="0"/>
+              <a:t>(0.05 to 0.067)</a:t>
+            </a:r>
+          </a:p>
+        </p:txBody>
+      </p:sp>
       <p:pic>
         <p:nvPicPr>
-          <p:cNvPr id="3" name="Picture 2">
+          <p:cNvPr id="7" name="Picture 6" descr="A screenshot of a cell phone&#10;&#10;Description automatically generated">
             <a:extLst>
               <a:ext uri="{FF2B5EF4-FFF2-40B4-BE49-F238E27FC236}">
-                <a16:creationId xmlns:a16="http://schemas.microsoft.com/office/drawing/2014/main" id="{50C8F228-21A7-4069-A47D-DF6DDDA4D7B3}"/>
+                <a16:creationId xmlns:a16="http://schemas.microsoft.com/office/drawing/2014/main" id="{4A45DD21-7BF6-489C-9C57-8E649F4885DC}"/>
               </a:ext>
             </a:extLst>
           </p:cNvPr>
@@ -3537,54 +3607,14 @@
         </p:blipFill>
         <p:spPr>
           <a:xfrm>
-            <a:off x="1734212" y="1747684"/>
-            <a:ext cx="6008690" cy="3741581"/>
+            <a:off x="1237784" y="1436242"/>
+            <a:ext cx="6668431" cy="4115374"/>
           </a:xfrm>
           <a:prstGeom prst="rect">
             <a:avLst/>
           </a:prstGeom>
         </p:spPr>
       </p:pic>
-      <p:sp>
-        <p:nvSpPr>
-          <p:cNvPr id="4" name="Rectangle 3">
-            <a:extLst>
-              <a:ext uri="{FF2B5EF4-FFF2-40B4-BE49-F238E27FC236}">
-                <a16:creationId xmlns:a16="http://schemas.microsoft.com/office/drawing/2014/main" id="{6608DBBE-C619-4CEB-9667-544ECD27A105}"/>
-              </a:ext>
-            </a:extLst>
-          </p:cNvPr>
-          <p:cNvSpPr/>
-          <p:nvPr/>
-        </p:nvSpPr>
-        <p:spPr>
-          <a:xfrm>
-            <a:off x="207115" y="5616258"/>
-            <a:ext cx="9062884" cy="923330"/>
-          </a:xfrm>
-          <a:prstGeom prst="rect">
-            <a:avLst/>
-          </a:prstGeom>
-        </p:spPr>
-        <p:txBody>
-          <a:bodyPr wrap="square">
-            <a:spAutoFit/>
-          </a:bodyPr>
-          <a:lstStyle/>
-          <a:p>
-            <a:r>
-              <a:rPr lang="en-US" i="1" dirty="0"/>
-              <a:t>From visually inspecting the graph, most states have a relatively close spread.  The summary statistics show that 50% of the available data fall within the interval </a:t>
-            </a:r>
-          </a:p>
-          <a:p>
-            <a:r>
-              <a:rPr lang="en-US" i="1" dirty="0"/>
-              <a:t>(0.05 to 0.067)</a:t>
-            </a:r>
-          </a:p>
-        </p:txBody>
-      </p:sp>
     </p:spTree>
     <p:extLst>
       <p:ext uri="{BB962C8B-B14F-4D97-AF65-F5344CB8AC3E}">
@@ -3702,12 +3732,46 @@
           </a:p>
         </p:txBody>
       </p:sp>
+      <p:sp>
+        <p:nvSpPr>
+          <p:cNvPr id="6" name="Rectangle 5">
+            <a:extLst>
+              <a:ext uri="{FF2B5EF4-FFF2-40B4-BE49-F238E27FC236}">
+                <a16:creationId xmlns:a16="http://schemas.microsoft.com/office/drawing/2014/main" id="{F8B83E26-92F5-4B23-ACBB-69BAFA025801}"/>
+              </a:ext>
+            </a:extLst>
+          </p:cNvPr>
+          <p:cNvSpPr/>
+          <p:nvPr/>
+        </p:nvSpPr>
+        <p:spPr>
+          <a:xfrm>
+            <a:off x="207115" y="5964581"/>
+            <a:ext cx="9062884" cy="646331"/>
+          </a:xfrm>
+          <a:prstGeom prst="rect">
+            <a:avLst/>
+          </a:prstGeom>
+        </p:spPr>
+        <p:txBody>
+          <a:bodyPr wrap="square">
+            <a:spAutoFit/>
+          </a:bodyPr>
+          <a:lstStyle/>
+          <a:p>
+            <a:r>
+              <a:rPr lang="en-US" i="1" dirty="0"/>
+              <a:t>There is much more variation in the IBU data, possibly due to missing values or regional preferences.</a:t>
+            </a:r>
+          </a:p>
+        </p:txBody>
+      </p:sp>
       <p:pic>
         <p:nvPicPr>
-          <p:cNvPr id="4" name="Picture 3">
+          <p:cNvPr id="7" name="Picture 6" descr="A screenshot of a cell phone&#10;&#10;Description automatically generated">
             <a:extLst>
               <a:ext uri="{FF2B5EF4-FFF2-40B4-BE49-F238E27FC236}">
-                <a16:creationId xmlns:a16="http://schemas.microsoft.com/office/drawing/2014/main" id="{E6BC3C28-E6F3-4BB8-B6C2-F67DC0DCD19A}"/>
+                <a16:creationId xmlns:a16="http://schemas.microsoft.com/office/drawing/2014/main" id="{FF85213C-4012-4ADB-A556-14903EDF1BD7}"/>
               </a:ext>
             </a:extLst>
           </p:cNvPr>
@@ -3724,48 +3788,14 @@
         </p:blipFill>
         <p:spPr>
           <a:xfrm>
-            <a:off x="1479926" y="1445730"/>
-            <a:ext cx="6521073" cy="4613675"/>
+            <a:off x="1237783" y="1610403"/>
+            <a:ext cx="6668431" cy="4115374"/>
           </a:xfrm>
           <a:prstGeom prst="rect">
             <a:avLst/>
           </a:prstGeom>
         </p:spPr>
       </p:pic>
-      <p:sp>
-        <p:nvSpPr>
-          <p:cNvPr id="6" name="Rectangle 5">
-            <a:extLst>
-              <a:ext uri="{FF2B5EF4-FFF2-40B4-BE49-F238E27FC236}">
-                <a16:creationId xmlns:a16="http://schemas.microsoft.com/office/drawing/2014/main" id="{F8B83E26-92F5-4B23-ACBB-69BAFA025801}"/>
-              </a:ext>
-            </a:extLst>
-          </p:cNvPr>
-          <p:cNvSpPr/>
-          <p:nvPr/>
-        </p:nvSpPr>
-        <p:spPr>
-          <a:xfrm>
-            <a:off x="207115" y="5964581"/>
-            <a:ext cx="9062884" cy="646331"/>
-          </a:xfrm>
-          <a:prstGeom prst="rect">
-            <a:avLst/>
-          </a:prstGeom>
-        </p:spPr>
-        <p:txBody>
-          <a:bodyPr wrap="square">
-            <a:spAutoFit/>
-          </a:bodyPr>
-          <a:lstStyle/>
-          <a:p>
-            <a:r>
-              <a:rPr lang="en-US" i="1" dirty="0"/>
-              <a:t>There is much more variation in the IBU data, possibly due to missing values or regional preferences.</a:t>
-            </a:r>
-          </a:p>
-        </p:txBody>
-      </p:sp>
     </p:spTree>
     <p:extLst>
       <p:ext uri="{BB962C8B-B14F-4D97-AF65-F5344CB8AC3E}">
@@ -4102,10 +4132,10 @@
       </p:sp>
       <p:pic>
         <p:nvPicPr>
-          <p:cNvPr id="4" name="Picture 3">
+          <p:cNvPr id="3" name="Picture 2">
             <a:extLst>
               <a:ext uri="{FF2B5EF4-FFF2-40B4-BE49-F238E27FC236}">
-                <a16:creationId xmlns:a16="http://schemas.microsoft.com/office/drawing/2014/main" id="{68540C9F-2B3E-4D10-9FC9-E0BCA9317AD7}"/>
+                <a16:creationId xmlns:a16="http://schemas.microsoft.com/office/drawing/2014/main" id="{C9BE29F8-D755-46CA-9143-78027D80052F}"/>
               </a:ext>
             </a:extLst>
           </p:cNvPr>
@@ -4122,8 +4152,8 @@
         </p:blipFill>
         <p:spPr>
           <a:xfrm>
-            <a:off x="2124074" y="3058395"/>
-            <a:ext cx="4895850" cy="2171700"/>
+            <a:off x="2505992" y="3361403"/>
+            <a:ext cx="4132015" cy="1868692"/>
           </a:xfrm>
           <a:prstGeom prst="rect">
             <a:avLst/>
@@ -4267,10 +4297,10 @@
       </p:sp>
       <p:pic>
         <p:nvPicPr>
-          <p:cNvPr id="3" name="Picture 2">
+          <p:cNvPr id="6" name="Picture 5">
             <a:extLst>
               <a:ext uri="{FF2B5EF4-FFF2-40B4-BE49-F238E27FC236}">
-                <a16:creationId xmlns:a16="http://schemas.microsoft.com/office/drawing/2014/main" id="{931E8A7D-20B1-43C1-AC5C-26A5B32FC9BB}"/>
+                <a16:creationId xmlns:a16="http://schemas.microsoft.com/office/drawing/2014/main" id="{4C2EFC3A-6257-4A76-B439-81CC45AA057C}"/>
               </a:ext>
             </a:extLst>
           </p:cNvPr>
@@ -4287,8 +4317,8 @@
         </p:blipFill>
         <p:spPr>
           <a:xfrm>
-            <a:off x="110613" y="3149122"/>
-            <a:ext cx="4920132" cy="3421284"/>
+            <a:off x="5236947" y="3429000"/>
+            <a:ext cx="3534655" cy="2250051"/>
           </a:xfrm>
           <a:prstGeom prst="rect">
             <a:avLst/>
@@ -4297,10 +4327,10 @@
       </p:pic>
       <p:pic>
         <p:nvPicPr>
-          <p:cNvPr id="6" name="Picture 5">
+          <p:cNvPr id="7" name="Picture 6" descr="A screenshot of a cell phone&#10;&#10;Description automatically generated">
             <a:extLst>
               <a:ext uri="{FF2B5EF4-FFF2-40B4-BE49-F238E27FC236}">
-                <a16:creationId xmlns:a16="http://schemas.microsoft.com/office/drawing/2014/main" id="{4C2EFC3A-6257-4A76-B439-81CC45AA057C}"/>
+                <a16:creationId xmlns:a16="http://schemas.microsoft.com/office/drawing/2014/main" id="{CD2B4A56-248D-4CF6-86C1-3EC203AB1528}"/>
               </a:ext>
             </a:extLst>
           </p:cNvPr>
@@ -4317,8 +4347,8 @@
         </p:blipFill>
         <p:spPr>
           <a:xfrm>
-            <a:off x="5236947" y="3304509"/>
-            <a:ext cx="3534655" cy="2250051"/>
+            <a:off x="122235" y="3304509"/>
+            <a:ext cx="4742314" cy="2926685"/>
           </a:xfrm>
           <a:prstGeom prst="rect">
             <a:avLst/>

</xml_diff>

<commit_message>
updated presentation and eda
</commit_message>
<xml_diff>
--- a/presentation/DS6306_Proj1_Presentation.pptx
+++ b/presentation/DS6306_Proj1_Presentation.pptx
@@ -4,18 +4,22 @@
   <p:sldMasterIdLst>
     <p:sldMasterId id="2147483672" r:id="rId1"/>
   </p:sldMasterIdLst>
+  <p:notesMasterIdLst>
+    <p:notesMasterId r:id="rId14"/>
+  </p:notesMasterIdLst>
   <p:sldIdLst>
     <p:sldId id="580" r:id="rId2"/>
-    <p:sldId id="621" r:id="rId3"/>
-    <p:sldId id="622" r:id="rId4"/>
-    <p:sldId id="623" r:id="rId5"/>
-    <p:sldId id="624" r:id="rId6"/>
-    <p:sldId id="625" r:id="rId7"/>
-    <p:sldId id="626" r:id="rId8"/>
-    <p:sldId id="627" r:id="rId9"/>
-    <p:sldId id="628" r:id="rId10"/>
-    <p:sldId id="629" r:id="rId11"/>
-    <p:sldId id="526" r:id="rId12"/>
+    <p:sldId id="622" r:id="rId3"/>
+    <p:sldId id="630" r:id="rId4"/>
+    <p:sldId id="621" r:id="rId5"/>
+    <p:sldId id="623" r:id="rId6"/>
+    <p:sldId id="624" r:id="rId7"/>
+    <p:sldId id="625" r:id="rId8"/>
+    <p:sldId id="626" r:id="rId9"/>
+    <p:sldId id="627" r:id="rId10"/>
+    <p:sldId id="628" r:id="rId11"/>
+    <p:sldId id="629" r:id="rId12"/>
+    <p:sldId id="526" r:id="rId13"/>
   </p:sldIdLst>
   <p:sldSz cx="9144000" cy="6858000" type="screen4x3"/>
   <p:notesSz cx="6858000" cy="9144000"/>
@@ -128,6 +132,485 @@
     <p1510:client id="{65C67A5B-D439-DD4E-A637-827378D75345}" v="59" dt="2019-10-10T15:48:12.011"/>
   </p1510:revLst>
 </p1510:revInfo>
+</file>
+
+<file path=ppt/notesMasters/notesMaster1.xml><?xml version="1.0" encoding="utf-8"?>
+<p:notesMaster xmlns:a="http://schemas.openxmlformats.org/drawingml/2006/main" xmlns:r="http://schemas.openxmlformats.org/officeDocument/2006/relationships" xmlns:p="http://schemas.openxmlformats.org/presentationml/2006/main">
+  <p:cSld>
+    <p:bg>
+      <p:bgRef idx="1001">
+        <a:schemeClr val="bg1"/>
+      </p:bgRef>
+    </p:bg>
+    <p:spTree>
+      <p:nvGrpSpPr>
+        <p:cNvPr id="1" name=""/>
+        <p:cNvGrpSpPr/>
+        <p:nvPr/>
+      </p:nvGrpSpPr>
+      <p:grpSpPr>
+        <a:xfrm>
+          <a:off x="0" y="0"/>
+          <a:ext cx="0" cy="0"/>
+          <a:chOff x="0" y="0"/>
+          <a:chExt cx="0" cy="0"/>
+        </a:xfrm>
+      </p:grpSpPr>
+      <p:sp>
+        <p:nvSpPr>
+          <p:cNvPr id="2" name="Header Placeholder 1"/>
+          <p:cNvSpPr>
+            <a:spLocks noGrp="1"/>
+          </p:cNvSpPr>
+          <p:nvPr>
+            <p:ph type="hdr" sz="quarter"/>
+          </p:nvPr>
+        </p:nvSpPr>
+        <p:spPr>
+          <a:xfrm>
+            <a:off x="0" y="0"/>
+            <a:ext cx="2971800" cy="458788"/>
+          </a:xfrm>
+          <a:prstGeom prst="rect">
+            <a:avLst/>
+          </a:prstGeom>
+        </p:spPr>
+        <p:txBody>
+          <a:bodyPr vert="horz" lIns="91440" tIns="45720" rIns="91440" bIns="45720" rtlCol="0"/>
+          <a:lstStyle>
+            <a:lvl1pPr algn="l">
+              <a:defRPr sz="1200"/>
+            </a:lvl1pPr>
+          </a:lstStyle>
+          <a:p>
+            <a:endParaRPr lang="en-US"/>
+          </a:p>
+        </p:txBody>
+      </p:sp>
+      <p:sp>
+        <p:nvSpPr>
+          <p:cNvPr id="3" name="Date Placeholder 2"/>
+          <p:cNvSpPr>
+            <a:spLocks noGrp="1"/>
+          </p:cNvSpPr>
+          <p:nvPr>
+            <p:ph type="dt" idx="1"/>
+          </p:nvPr>
+        </p:nvSpPr>
+        <p:spPr>
+          <a:xfrm>
+            <a:off x="3884613" y="0"/>
+            <a:ext cx="2971800" cy="458788"/>
+          </a:xfrm>
+          <a:prstGeom prst="rect">
+            <a:avLst/>
+          </a:prstGeom>
+        </p:spPr>
+        <p:txBody>
+          <a:bodyPr vert="horz" lIns="91440" tIns="45720" rIns="91440" bIns="45720" rtlCol="0"/>
+          <a:lstStyle>
+            <a:lvl1pPr algn="r">
+              <a:defRPr sz="1200"/>
+            </a:lvl1pPr>
+          </a:lstStyle>
+          <a:p>
+            <a:fld id="{05A716D1-0E3B-43FE-813B-2DAFF8230A94}" type="datetimeFigureOut">
+              <a:rPr lang="en-US" smtClean="0"/>
+              <a:t>10/19/2019</a:t>
+            </a:fld>
+            <a:endParaRPr lang="en-US"/>
+          </a:p>
+        </p:txBody>
+      </p:sp>
+      <p:sp>
+        <p:nvSpPr>
+          <p:cNvPr id="4" name="Slide Image Placeholder 3"/>
+          <p:cNvSpPr>
+            <a:spLocks noGrp="1" noRot="1" noChangeAspect="1"/>
+          </p:cNvSpPr>
+          <p:nvPr>
+            <p:ph type="sldImg" idx="2"/>
+          </p:nvPr>
+        </p:nvSpPr>
+        <p:spPr>
+          <a:xfrm>
+            <a:off x="1371600" y="1143000"/>
+            <a:ext cx="4114800" cy="3086100"/>
+          </a:xfrm>
+          <a:prstGeom prst="rect">
+            <a:avLst/>
+          </a:prstGeom>
+          <a:noFill/>
+          <a:ln w="12700">
+            <a:solidFill>
+              <a:prstClr val="black"/>
+            </a:solidFill>
+          </a:ln>
+        </p:spPr>
+        <p:txBody>
+          <a:bodyPr vert="horz" lIns="91440" tIns="45720" rIns="91440" bIns="45720" rtlCol="0" anchor="ctr"/>
+          <a:lstStyle/>
+          <a:p>
+            <a:endParaRPr lang="en-US"/>
+          </a:p>
+        </p:txBody>
+      </p:sp>
+      <p:sp>
+        <p:nvSpPr>
+          <p:cNvPr id="5" name="Notes Placeholder 4"/>
+          <p:cNvSpPr>
+            <a:spLocks noGrp="1"/>
+          </p:cNvSpPr>
+          <p:nvPr>
+            <p:ph type="body" sz="quarter" idx="3"/>
+          </p:nvPr>
+        </p:nvSpPr>
+        <p:spPr>
+          <a:xfrm>
+            <a:off x="685800" y="4400550"/>
+            <a:ext cx="5486400" cy="3600450"/>
+          </a:xfrm>
+          <a:prstGeom prst="rect">
+            <a:avLst/>
+          </a:prstGeom>
+        </p:spPr>
+        <p:txBody>
+          <a:bodyPr vert="horz" lIns="91440" tIns="45720" rIns="91440" bIns="45720" rtlCol="0"/>
+          <a:lstStyle/>
+          <a:p>
+            <a:pPr lvl="0"/>
+            <a:r>
+              <a:rPr lang="en-US"/>
+              <a:t>Click to edit Master text styles</a:t>
+            </a:r>
+          </a:p>
+          <a:p>
+            <a:pPr lvl="1"/>
+            <a:r>
+              <a:rPr lang="en-US"/>
+              <a:t>Second level</a:t>
+            </a:r>
+          </a:p>
+          <a:p>
+            <a:pPr lvl="2"/>
+            <a:r>
+              <a:rPr lang="en-US"/>
+              <a:t>Third level</a:t>
+            </a:r>
+          </a:p>
+          <a:p>
+            <a:pPr lvl="3"/>
+            <a:r>
+              <a:rPr lang="en-US"/>
+              <a:t>Fourth level</a:t>
+            </a:r>
+          </a:p>
+          <a:p>
+            <a:pPr lvl="4"/>
+            <a:r>
+              <a:rPr lang="en-US"/>
+              <a:t>Fifth level</a:t>
+            </a:r>
+          </a:p>
+        </p:txBody>
+      </p:sp>
+      <p:sp>
+        <p:nvSpPr>
+          <p:cNvPr id="6" name="Footer Placeholder 5"/>
+          <p:cNvSpPr>
+            <a:spLocks noGrp="1"/>
+          </p:cNvSpPr>
+          <p:nvPr>
+            <p:ph type="ftr" sz="quarter" idx="4"/>
+          </p:nvPr>
+        </p:nvSpPr>
+        <p:spPr>
+          <a:xfrm>
+            <a:off x="0" y="8685213"/>
+            <a:ext cx="2971800" cy="458787"/>
+          </a:xfrm>
+          <a:prstGeom prst="rect">
+            <a:avLst/>
+          </a:prstGeom>
+        </p:spPr>
+        <p:txBody>
+          <a:bodyPr vert="horz" lIns="91440" tIns="45720" rIns="91440" bIns="45720" rtlCol="0" anchor="b"/>
+          <a:lstStyle>
+            <a:lvl1pPr algn="l">
+              <a:defRPr sz="1200"/>
+            </a:lvl1pPr>
+          </a:lstStyle>
+          <a:p>
+            <a:endParaRPr lang="en-US"/>
+          </a:p>
+        </p:txBody>
+      </p:sp>
+      <p:sp>
+        <p:nvSpPr>
+          <p:cNvPr id="7" name="Slide Number Placeholder 6"/>
+          <p:cNvSpPr>
+            <a:spLocks noGrp="1"/>
+          </p:cNvSpPr>
+          <p:nvPr>
+            <p:ph type="sldNum" sz="quarter" idx="5"/>
+          </p:nvPr>
+        </p:nvSpPr>
+        <p:spPr>
+          <a:xfrm>
+            <a:off x="3884613" y="8685213"/>
+            <a:ext cx="2971800" cy="458787"/>
+          </a:xfrm>
+          <a:prstGeom prst="rect">
+            <a:avLst/>
+          </a:prstGeom>
+        </p:spPr>
+        <p:txBody>
+          <a:bodyPr vert="horz" lIns="91440" tIns="45720" rIns="91440" bIns="45720" rtlCol="0" anchor="b"/>
+          <a:lstStyle>
+            <a:lvl1pPr algn="r">
+              <a:defRPr sz="1200"/>
+            </a:lvl1pPr>
+          </a:lstStyle>
+          <a:p>
+            <a:fld id="{1B0D91D7-F22D-4CDC-8F75-E7F369B9B3B7}" type="slidenum">
+              <a:rPr lang="en-US" smtClean="0"/>
+              <a:t>‹#›</a:t>
+            </a:fld>
+            <a:endParaRPr lang="en-US"/>
+          </a:p>
+        </p:txBody>
+      </p:sp>
+    </p:spTree>
+    <p:extLst>
+      <p:ext uri="{BB962C8B-B14F-4D97-AF65-F5344CB8AC3E}">
+        <p14:creationId xmlns:p14="http://schemas.microsoft.com/office/powerpoint/2010/main" val="348396362"/>
+      </p:ext>
+    </p:extLst>
+  </p:cSld>
+  <p:clrMap bg1="lt1" tx1="dk1" bg2="lt2" tx2="dk2" accent1="accent1" accent2="accent2" accent3="accent3" accent4="accent4" accent5="accent5" accent6="accent6" hlink="hlink" folHlink="folHlink"/>
+  <p:notesStyle>
+    <a:lvl1pPr marL="0" algn="l" defTabSz="914400" rtl="0" eaLnBrk="1" latinLnBrk="0" hangingPunct="1">
+      <a:defRPr sz="1200" kern="1200">
+        <a:solidFill>
+          <a:schemeClr val="tx1"/>
+        </a:solidFill>
+        <a:latin typeface="+mn-lt"/>
+        <a:ea typeface="+mn-ea"/>
+        <a:cs typeface="+mn-cs"/>
+      </a:defRPr>
+    </a:lvl1pPr>
+    <a:lvl2pPr marL="457200" algn="l" defTabSz="914400" rtl="0" eaLnBrk="1" latinLnBrk="0" hangingPunct="1">
+      <a:defRPr sz="1200" kern="1200">
+        <a:solidFill>
+          <a:schemeClr val="tx1"/>
+        </a:solidFill>
+        <a:latin typeface="+mn-lt"/>
+        <a:ea typeface="+mn-ea"/>
+        <a:cs typeface="+mn-cs"/>
+      </a:defRPr>
+    </a:lvl2pPr>
+    <a:lvl3pPr marL="914400" algn="l" defTabSz="914400" rtl="0" eaLnBrk="1" latinLnBrk="0" hangingPunct="1">
+      <a:defRPr sz="1200" kern="1200">
+        <a:solidFill>
+          <a:schemeClr val="tx1"/>
+        </a:solidFill>
+        <a:latin typeface="+mn-lt"/>
+        <a:ea typeface="+mn-ea"/>
+        <a:cs typeface="+mn-cs"/>
+      </a:defRPr>
+    </a:lvl3pPr>
+    <a:lvl4pPr marL="1371600" algn="l" defTabSz="914400" rtl="0" eaLnBrk="1" latinLnBrk="0" hangingPunct="1">
+      <a:defRPr sz="1200" kern="1200">
+        <a:solidFill>
+          <a:schemeClr val="tx1"/>
+        </a:solidFill>
+        <a:latin typeface="+mn-lt"/>
+        <a:ea typeface="+mn-ea"/>
+        <a:cs typeface="+mn-cs"/>
+      </a:defRPr>
+    </a:lvl4pPr>
+    <a:lvl5pPr marL="1828800" algn="l" defTabSz="914400" rtl="0" eaLnBrk="1" latinLnBrk="0" hangingPunct="1">
+      <a:defRPr sz="1200" kern="1200">
+        <a:solidFill>
+          <a:schemeClr val="tx1"/>
+        </a:solidFill>
+        <a:latin typeface="+mn-lt"/>
+        <a:ea typeface="+mn-ea"/>
+        <a:cs typeface="+mn-cs"/>
+      </a:defRPr>
+    </a:lvl5pPr>
+    <a:lvl6pPr marL="2286000" algn="l" defTabSz="914400" rtl="0" eaLnBrk="1" latinLnBrk="0" hangingPunct="1">
+      <a:defRPr sz="1200" kern="1200">
+        <a:solidFill>
+          <a:schemeClr val="tx1"/>
+        </a:solidFill>
+        <a:latin typeface="+mn-lt"/>
+        <a:ea typeface="+mn-ea"/>
+        <a:cs typeface="+mn-cs"/>
+      </a:defRPr>
+    </a:lvl6pPr>
+    <a:lvl7pPr marL="2743200" algn="l" defTabSz="914400" rtl="0" eaLnBrk="1" latinLnBrk="0" hangingPunct="1">
+      <a:defRPr sz="1200" kern="1200">
+        <a:solidFill>
+          <a:schemeClr val="tx1"/>
+        </a:solidFill>
+        <a:latin typeface="+mn-lt"/>
+        <a:ea typeface="+mn-ea"/>
+        <a:cs typeface="+mn-cs"/>
+      </a:defRPr>
+    </a:lvl7pPr>
+    <a:lvl8pPr marL="3200400" algn="l" defTabSz="914400" rtl="0" eaLnBrk="1" latinLnBrk="0" hangingPunct="1">
+      <a:defRPr sz="1200" kern="1200">
+        <a:solidFill>
+          <a:schemeClr val="tx1"/>
+        </a:solidFill>
+        <a:latin typeface="+mn-lt"/>
+        <a:ea typeface="+mn-ea"/>
+        <a:cs typeface="+mn-cs"/>
+      </a:defRPr>
+    </a:lvl8pPr>
+    <a:lvl9pPr marL="3657600" algn="l" defTabSz="914400" rtl="0" eaLnBrk="1" latinLnBrk="0" hangingPunct="1">
+      <a:defRPr sz="1200" kern="1200">
+        <a:solidFill>
+          <a:schemeClr val="tx1"/>
+        </a:solidFill>
+        <a:latin typeface="+mn-lt"/>
+        <a:ea typeface="+mn-ea"/>
+        <a:cs typeface="+mn-cs"/>
+      </a:defRPr>
+    </a:lvl9pPr>
+  </p:notesStyle>
+</p:notesMaster>
+</file>
+
+<file path=ppt/notesSlides/notesSlide1.xml><?xml version="1.0" encoding="utf-8"?>
+<p:notes xmlns:a="http://schemas.openxmlformats.org/drawingml/2006/main" xmlns:r="http://schemas.openxmlformats.org/officeDocument/2006/relationships" xmlns:p="http://schemas.openxmlformats.org/presentationml/2006/main">
+  <p:cSld>
+    <p:spTree>
+      <p:nvGrpSpPr>
+        <p:cNvPr id="1" name=""/>
+        <p:cNvGrpSpPr/>
+        <p:nvPr/>
+      </p:nvGrpSpPr>
+      <p:grpSpPr>
+        <a:xfrm>
+          <a:off x="0" y="0"/>
+          <a:ext cx="0" cy="0"/>
+          <a:chOff x="0" y="0"/>
+          <a:chExt cx="0" cy="0"/>
+        </a:xfrm>
+      </p:grpSpPr>
+      <p:sp>
+        <p:nvSpPr>
+          <p:cNvPr id="2" name="Slide Image Placeholder 1"/>
+          <p:cNvSpPr>
+            <a:spLocks noGrp="1" noRot="1" noChangeAspect="1"/>
+          </p:cNvSpPr>
+          <p:nvPr>
+            <p:ph type="sldImg"/>
+          </p:nvPr>
+        </p:nvSpPr>
+        <p:spPr/>
+      </p:sp>
+      <p:sp>
+        <p:nvSpPr>
+          <p:cNvPr id="3" name="Notes Placeholder 2"/>
+          <p:cNvSpPr>
+            <a:spLocks noGrp="1"/>
+          </p:cNvSpPr>
+          <p:nvPr>
+            <p:ph type="body" idx="1"/>
+          </p:nvPr>
+        </p:nvSpPr>
+        <p:spPr/>
+        <p:txBody>
+          <a:bodyPr/>
+          <a:lstStyle/>
+          <a:p>
+            <a:pPr marL="0" marR="0" lvl="0" indent="0" algn="l" defTabSz="914400" rtl="0" eaLnBrk="1" fontAlgn="auto" latinLnBrk="0" hangingPunct="1">
+              <a:lnSpc>
+                <a:spcPct val="100000"/>
+              </a:lnSpc>
+              <a:spcBef>
+                <a:spcPts val="0"/>
+              </a:spcBef>
+              <a:spcAft>
+                <a:spcPts val="0"/>
+              </a:spcAft>
+              <a:buClrTx/>
+              <a:buSzTx/>
+              <a:buFontTx/>
+              <a:buNone/>
+              <a:tabLst/>
+              <a:defRPr/>
+            </a:pPr>
+            <a:r>
+              <a:rPr lang="en-US" i="1" dirty="0"/>
+              <a:t>2,410 US craft beers</a:t>
+            </a:r>
+          </a:p>
+          <a:p>
+            <a:pPr marL="0" marR="0" lvl="0" indent="0" algn="l" defTabSz="914400" rtl="0" eaLnBrk="1" fontAlgn="auto" latinLnBrk="0" hangingPunct="1">
+              <a:lnSpc>
+                <a:spcPct val="100000"/>
+              </a:lnSpc>
+              <a:spcBef>
+                <a:spcPts val="0"/>
+              </a:spcBef>
+              <a:spcAft>
+                <a:spcPts val="0"/>
+              </a:spcAft>
+              <a:buClrTx/>
+              <a:buSzTx/>
+              <a:buFontTx/>
+              <a:buNone/>
+              <a:tabLst/>
+              <a:defRPr/>
+            </a:pPr>
+            <a:r>
+              <a:rPr lang="en-US" i="1" dirty="0"/>
+              <a:t>558 US craft breweries</a:t>
+            </a:r>
+          </a:p>
+          <a:p>
+            <a:endParaRPr lang="en-US" dirty="0"/>
+          </a:p>
+        </p:txBody>
+      </p:sp>
+      <p:sp>
+        <p:nvSpPr>
+          <p:cNvPr id="4" name="Slide Number Placeholder 3"/>
+          <p:cNvSpPr>
+            <a:spLocks noGrp="1"/>
+          </p:cNvSpPr>
+          <p:nvPr>
+            <p:ph type="sldNum" sz="quarter" idx="5"/>
+          </p:nvPr>
+        </p:nvSpPr>
+        <p:spPr/>
+        <p:txBody>
+          <a:bodyPr/>
+          <a:lstStyle/>
+          <a:p>
+            <a:fld id="{1B0D91D7-F22D-4CDC-8F75-E7F369B9B3B7}" type="slidenum">
+              <a:rPr lang="en-US" smtClean="0"/>
+              <a:t>2</a:t>
+            </a:fld>
+            <a:endParaRPr lang="en-US"/>
+          </a:p>
+        </p:txBody>
+      </p:sp>
+    </p:spTree>
+    <p:extLst>
+      <p:ext uri="{BB962C8B-B14F-4D97-AF65-F5344CB8AC3E}">
+        <p14:creationId xmlns:p14="http://schemas.microsoft.com/office/powerpoint/2010/main" val="1036460107"/>
+      </p:ext>
+    </p:extLst>
+  </p:cSld>
+  <p:clrMapOvr>
+    <a:masterClrMapping/>
+  </p:clrMapOvr>
+</p:notes>
 </file>
 
 <file path=ppt/slideLayouts/slideLayout1.xml><?xml version="1.0" encoding="utf-8"?>
@@ -2301,7 +2784,7 @@
           <a:p>
             <a:r>
               <a:rPr lang="en-US" dirty="0"/>
-              <a:t>Beer Analysis EDA </a:t>
+              <a:t>US Craft Beers and Breweries</a:t>
             </a:r>
           </a:p>
         </p:txBody>
@@ -2399,6 +2882,201 @@
           <a:p>
             <a:r>
               <a:rPr lang="en-US" dirty="0"/>
+              <a:t>Summary Statistics (ABV)</a:t>
+            </a:r>
+          </a:p>
+        </p:txBody>
+      </p:sp>
+      <p:sp>
+        <p:nvSpPr>
+          <p:cNvPr id="5" name="Content Placeholder 4">
+            <a:extLst>
+              <a:ext uri="{FF2B5EF4-FFF2-40B4-BE49-F238E27FC236}">
+                <a16:creationId xmlns:a16="http://schemas.microsoft.com/office/drawing/2014/main" id="{375CDB98-7F05-41AD-9F29-81E3D0CFBEFF}"/>
+              </a:ext>
+            </a:extLst>
+          </p:cNvPr>
+          <p:cNvSpPr>
+            <a:spLocks noGrp="1"/>
+          </p:cNvSpPr>
+          <p:nvPr>
+            <p:ph idx="1"/>
+          </p:nvPr>
+        </p:nvSpPr>
+        <p:spPr>
+          <a:xfrm>
+            <a:off x="243347" y="1555954"/>
+            <a:ext cx="8155857" cy="5014451"/>
+          </a:xfrm>
+        </p:spPr>
+        <p:txBody>
+          <a:bodyPr/>
+          <a:lstStyle/>
+          <a:p>
+            <a:r>
+              <a:rPr lang="en-US" sz="2800" dirty="0"/>
+              <a:t>The distribution of the ABV data is slightly right skewed, with most values falling within ~0.014 units of the mean of ~0.06.</a:t>
+            </a:r>
+          </a:p>
+          <a:p>
+            <a:pPr marL="0" indent="0">
+              <a:buNone/>
+            </a:pPr>
+            <a:endParaRPr lang="en-US" dirty="0"/>
+          </a:p>
+          <a:p>
+            <a:endParaRPr lang="en-US" dirty="0"/>
+          </a:p>
+          <a:p>
+            <a:endParaRPr lang="en-US" dirty="0"/>
+          </a:p>
+          <a:p>
+            <a:endParaRPr lang="en-US" dirty="0"/>
+          </a:p>
+          <a:p>
+            <a:endParaRPr lang="en-US" dirty="0"/>
+          </a:p>
+          <a:p>
+            <a:endParaRPr lang="en-US" dirty="0"/>
+          </a:p>
+          <a:p>
+            <a:pPr marL="0" indent="0">
+              <a:buNone/>
+            </a:pPr>
+            <a:endParaRPr lang="en-US" sz="1600" i="1" dirty="0"/>
+          </a:p>
+          <a:p>
+            <a:pPr marL="0" indent="0">
+              <a:buNone/>
+            </a:pPr>
+            <a:endParaRPr lang="en-US" dirty="0"/>
+          </a:p>
+          <a:p>
+            <a:pPr marL="0" indent="0">
+              <a:buNone/>
+            </a:pPr>
+            <a:endParaRPr lang="en-US" dirty="0"/>
+          </a:p>
+        </p:txBody>
+      </p:sp>
+      <p:pic>
+        <p:nvPicPr>
+          <p:cNvPr id="6" name="Picture 5">
+            <a:extLst>
+              <a:ext uri="{FF2B5EF4-FFF2-40B4-BE49-F238E27FC236}">
+                <a16:creationId xmlns:a16="http://schemas.microsoft.com/office/drawing/2014/main" id="{4C2EFC3A-6257-4A76-B439-81CC45AA057C}"/>
+              </a:ext>
+            </a:extLst>
+          </p:cNvPr>
+          <p:cNvPicPr>
+            <a:picLocks noChangeAspect="1"/>
+          </p:cNvPicPr>
+          <p:nvPr/>
+        </p:nvPicPr>
+        <p:blipFill>
+          <a:blip r:embed="rId2"/>
+          <a:stretch>
+            <a:fillRect/>
+          </a:stretch>
+        </p:blipFill>
+        <p:spPr>
+          <a:xfrm>
+            <a:off x="5236947" y="3429000"/>
+            <a:ext cx="3534655" cy="2250051"/>
+          </a:xfrm>
+          <a:prstGeom prst="rect">
+            <a:avLst/>
+          </a:prstGeom>
+        </p:spPr>
+      </p:pic>
+      <p:pic>
+        <p:nvPicPr>
+          <p:cNvPr id="9" name="Picture 8" descr="A picture containing screenshot&#10;&#10;Description automatically generated">
+            <a:extLst>
+              <a:ext uri="{FF2B5EF4-FFF2-40B4-BE49-F238E27FC236}">
+                <a16:creationId xmlns:a16="http://schemas.microsoft.com/office/drawing/2014/main" id="{A0999F5D-1C17-405E-862B-4AB0EBEBCDEA}"/>
+              </a:ext>
+            </a:extLst>
+          </p:cNvPr>
+          <p:cNvPicPr>
+            <a:picLocks noChangeAspect="1"/>
+          </p:cNvPicPr>
+          <p:nvPr/>
+        </p:nvPicPr>
+        <p:blipFill>
+          <a:blip r:embed="rId3"/>
+          <a:stretch>
+            <a:fillRect/>
+          </a:stretch>
+        </p:blipFill>
+        <p:spPr>
+          <a:xfrm>
+            <a:off x="433935" y="3429000"/>
+            <a:ext cx="3887340" cy="2399044"/>
+          </a:xfrm>
+          <a:prstGeom prst="rect">
+            <a:avLst/>
+          </a:prstGeom>
+        </p:spPr>
+      </p:pic>
+    </p:spTree>
+    <p:extLst>
+      <p:ext uri="{BB962C8B-B14F-4D97-AF65-F5344CB8AC3E}">
+        <p14:creationId xmlns:p14="http://schemas.microsoft.com/office/powerpoint/2010/main" val="3477306886"/>
+      </p:ext>
+    </p:extLst>
+  </p:cSld>
+  <p:clrMapOvr>
+    <a:masterClrMapping/>
+  </p:clrMapOvr>
+</p:sld>
+</file>
+
+<file path=ppt/slides/slide11.xml><?xml version="1.0" encoding="utf-8"?>
+<p:sld xmlns:a="http://schemas.openxmlformats.org/drawingml/2006/main" xmlns:r="http://schemas.openxmlformats.org/officeDocument/2006/relationships" xmlns:p="http://schemas.openxmlformats.org/presentationml/2006/main">
+  <p:cSld>
+    <p:spTree>
+      <p:nvGrpSpPr>
+        <p:cNvPr id="1" name=""/>
+        <p:cNvGrpSpPr/>
+        <p:nvPr/>
+      </p:nvGrpSpPr>
+      <p:grpSpPr>
+        <a:xfrm>
+          <a:off x="0" y="0"/>
+          <a:ext cx="0" cy="0"/>
+          <a:chOff x="0" y="0"/>
+          <a:chExt cx="0" cy="0"/>
+        </a:xfrm>
+      </p:grpSpPr>
+      <p:sp>
+        <p:nvSpPr>
+          <p:cNvPr id="2" name="Title 1">
+            <a:extLst>
+              <a:ext uri="{FF2B5EF4-FFF2-40B4-BE49-F238E27FC236}">
+                <a16:creationId xmlns:a16="http://schemas.microsoft.com/office/drawing/2014/main" id="{5B931770-76C9-F749-9B7D-08A4A1F13896}"/>
+              </a:ext>
+            </a:extLst>
+          </p:cNvPr>
+          <p:cNvSpPr>
+            <a:spLocks noGrp="1"/>
+          </p:cNvSpPr>
+          <p:nvPr>
+            <p:ph type="title"/>
+          </p:nvPr>
+        </p:nvSpPr>
+        <p:spPr>
+          <a:xfrm>
+            <a:off x="0" y="228600"/>
+            <a:ext cx="9144000" cy="1143000"/>
+          </a:xfrm>
+        </p:spPr>
+        <p:txBody>
+          <a:bodyPr/>
+          <a:lstStyle/>
+          <a:p>
+            <a:r>
+              <a:rPr lang="en-US" dirty="0"/>
               <a:t>IBV to ABU Relationship</a:t>
             </a:r>
           </a:p>
@@ -2513,7 +3191,7 @@
 </p:sld>
 </file>
 
-<file path=ppt/slides/slide11.xml><?xml version="1.0" encoding="utf-8"?>
+<file path=ppt/slides/slide12.xml><?xml version="1.0" encoding="utf-8"?>
 <p:sld xmlns:a="http://schemas.openxmlformats.org/drawingml/2006/main" xmlns:r="http://schemas.openxmlformats.org/officeDocument/2006/relationships" xmlns:p="http://schemas.openxmlformats.org/presentationml/2006/main">
   <p:cSld>
     <p:spTree>
@@ -2588,7 +3266,7 @@
           <a:p>
             <a:r>
               <a:rPr lang="en-US" dirty="0"/>
-              <a:t>Brewery Count by State</a:t>
+              <a:t>Data Sets and Definitions</a:t>
             </a:r>
           </a:p>
         </p:txBody>
@@ -2611,201 +3289,6 @@
         </p:nvSpPr>
         <p:spPr>
           <a:xfrm>
-            <a:off x="457199" y="1627905"/>
-            <a:ext cx="8229600" cy="4854011"/>
-          </a:xfrm>
-        </p:spPr>
-        <p:txBody>
-          <a:bodyPr/>
-          <a:lstStyle/>
-          <a:p>
-            <a:r>
-              <a:rPr lang="en-US" dirty="0"/>
-              <a:t>How many breweries are present in each state?</a:t>
-            </a:r>
-          </a:p>
-          <a:p>
-            <a:endParaRPr lang="en-US" dirty="0"/>
-          </a:p>
-          <a:p>
-            <a:endParaRPr lang="en-US" dirty="0"/>
-          </a:p>
-          <a:p>
-            <a:endParaRPr lang="en-US" dirty="0"/>
-          </a:p>
-          <a:p>
-            <a:endParaRPr lang="en-US" dirty="0"/>
-          </a:p>
-          <a:p>
-            <a:endParaRPr lang="en-US" dirty="0"/>
-          </a:p>
-          <a:p>
-            <a:pPr marL="0" indent="0">
-              <a:buNone/>
-            </a:pPr>
-            <a:endParaRPr lang="en-US" sz="1600" i="1" dirty="0"/>
-          </a:p>
-          <a:p>
-            <a:pPr marL="0" indent="0">
-              <a:buNone/>
-            </a:pPr>
-            <a:r>
-              <a:rPr lang="en-US" sz="1600" i="1" dirty="0"/>
-              <a:t>Note that all 50 states have at least one brewery listed, including the District of Columbia (DC), for a total of 51.</a:t>
-            </a:r>
-          </a:p>
-          <a:p>
-            <a:endParaRPr lang="en-US" dirty="0"/>
-          </a:p>
-          <a:p>
-            <a:pPr marL="0" indent="0">
-              <a:buNone/>
-            </a:pPr>
-            <a:endParaRPr lang="en-US" dirty="0"/>
-          </a:p>
-        </p:txBody>
-      </p:sp>
-      <p:pic>
-        <p:nvPicPr>
-          <p:cNvPr id="4" name="Picture 3" descr="A screenshot of a computer&#10;&#10;Description automatically generated">
-            <a:extLst>
-              <a:ext uri="{FF2B5EF4-FFF2-40B4-BE49-F238E27FC236}">
-                <a16:creationId xmlns:a16="http://schemas.microsoft.com/office/drawing/2014/main" id="{03FD9F28-5C08-45E2-8A9C-1AB2DC431109}"/>
-              </a:ext>
-            </a:extLst>
-          </p:cNvPr>
-          <p:cNvPicPr>
-            <a:picLocks noChangeAspect="1"/>
-          </p:cNvPicPr>
-          <p:nvPr/>
-        </p:nvPicPr>
-        <p:blipFill>
-          <a:blip r:embed="rId2"/>
-          <a:stretch>
-            <a:fillRect/>
-          </a:stretch>
-        </p:blipFill>
-        <p:spPr>
-          <a:xfrm>
-            <a:off x="190648" y="2943679"/>
-            <a:ext cx="4160125" cy="2567391"/>
-          </a:xfrm>
-          <a:prstGeom prst="rect">
-            <a:avLst/>
-          </a:prstGeom>
-        </p:spPr>
-      </p:pic>
-      <p:pic>
-        <p:nvPicPr>
-          <p:cNvPr id="8" name="Picture 7">
-            <a:extLst>
-              <a:ext uri="{FF2B5EF4-FFF2-40B4-BE49-F238E27FC236}">
-                <a16:creationId xmlns:a16="http://schemas.microsoft.com/office/drawing/2014/main" id="{953E4D53-5052-45F4-BE2B-D800A5E5CE4B}"/>
-              </a:ext>
-            </a:extLst>
-          </p:cNvPr>
-          <p:cNvPicPr>
-            <a:picLocks noChangeAspect="1"/>
-          </p:cNvPicPr>
-          <p:nvPr/>
-        </p:nvPicPr>
-        <p:blipFill>
-          <a:blip r:embed="rId3"/>
-          <a:stretch>
-            <a:fillRect/>
-          </a:stretch>
-        </p:blipFill>
-        <p:spPr>
-          <a:xfrm>
-            <a:off x="4793224" y="2939913"/>
-            <a:ext cx="4160126" cy="2567392"/>
-          </a:xfrm>
-          <a:prstGeom prst="rect">
-            <a:avLst/>
-          </a:prstGeom>
-        </p:spPr>
-      </p:pic>
-    </p:spTree>
-    <p:extLst>
-      <p:ext uri="{BB962C8B-B14F-4D97-AF65-F5344CB8AC3E}">
-        <p14:creationId xmlns:p14="http://schemas.microsoft.com/office/powerpoint/2010/main" val="3016725513"/>
-      </p:ext>
-    </p:extLst>
-  </p:cSld>
-  <p:clrMapOvr>
-    <a:masterClrMapping/>
-  </p:clrMapOvr>
-</p:sld>
-</file>
-
-<file path=ppt/slides/slide3.xml><?xml version="1.0" encoding="utf-8"?>
-<p:sld xmlns:a="http://schemas.openxmlformats.org/drawingml/2006/main" xmlns:r="http://schemas.openxmlformats.org/officeDocument/2006/relationships" xmlns:p="http://schemas.openxmlformats.org/presentationml/2006/main">
-  <p:cSld>
-    <p:spTree>
-      <p:nvGrpSpPr>
-        <p:cNvPr id="1" name=""/>
-        <p:cNvGrpSpPr/>
-        <p:nvPr/>
-      </p:nvGrpSpPr>
-      <p:grpSpPr>
-        <a:xfrm>
-          <a:off x="0" y="0"/>
-          <a:ext cx="0" cy="0"/>
-          <a:chOff x="0" y="0"/>
-          <a:chExt cx="0" cy="0"/>
-        </a:xfrm>
-      </p:grpSpPr>
-      <p:sp>
-        <p:nvSpPr>
-          <p:cNvPr id="2" name="Title 1">
-            <a:extLst>
-              <a:ext uri="{FF2B5EF4-FFF2-40B4-BE49-F238E27FC236}">
-                <a16:creationId xmlns:a16="http://schemas.microsoft.com/office/drawing/2014/main" id="{5B931770-76C9-F749-9B7D-08A4A1F13896}"/>
-              </a:ext>
-            </a:extLst>
-          </p:cNvPr>
-          <p:cNvSpPr>
-            <a:spLocks noGrp="1"/>
-          </p:cNvSpPr>
-          <p:nvPr>
-            <p:ph type="title"/>
-          </p:nvPr>
-        </p:nvSpPr>
-        <p:spPr>
-          <a:xfrm>
-            <a:off x="0" y="228600"/>
-            <a:ext cx="9144000" cy="1143000"/>
-          </a:xfrm>
-        </p:spPr>
-        <p:txBody>
-          <a:bodyPr/>
-          <a:lstStyle/>
-          <a:p>
-            <a:r>
-              <a:rPr lang="en-US" dirty="0"/>
-              <a:t>Available Data Sets</a:t>
-            </a:r>
-          </a:p>
-        </p:txBody>
-      </p:sp>
-      <p:sp>
-        <p:nvSpPr>
-          <p:cNvPr id="5" name="Content Placeholder 4">
-            <a:extLst>
-              <a:ext uri="{FF2B5EF4-FFF2-40B4-BE49-F238E27FC236}">
-                <a16:creationId xmlns:a16="http://schemas.microsoft.com/office/drawing/2014/main" id="{375CDB98-7F05-41AD-9F29-81E3D0CFBEFF}"/>
-              </a:ext>
-            </a:extLst>
-          </p:cNvPr>
-          <p:cNvSpPr>
-            <a:spLocks noGrp="1"/>
-          </p:cNvSpPr>
-          <p:nvPr>
-            <p:ph idx="1"/>
-          </p:nvPr>
-        </p:nvSpPr>
-        <p:spPr>
-          <a:xfrm>
             <a:off x="1084006" y="2148682"/>
             <a:ext cx="2455607" cy="672843"/>
           </a:xfrm>
@@ -2863,7 +3346,7 @@
           <p:nvPr/>
         </p:nvPicPr>
         <p:blipFill>
-          <a:blip r:embed="rId2"/>
+          <a:blip r:embed="rId3"/>
           <a:stretch>
             <a:fillRect/>
           </a:stretch>
@@ -2893,7 +3376,7 @@
           <p:nvPr/>
         </p:nvPicPr>
         <p:blipFill>
-          <a:blip r:embed="rId3"/>
+          <a:blip r:embed="rId4"/>
           <a:stretch>
             <a:fillRect/>
           </a:stretch>
@@ -3123,7 +3606,652 @@
 </p:sld>
 </file>
 
+<file path=ppt/slides/slide3.xml><?xml version="1.0" encoding="utf-8"?>
+<p:sld xmlns:a="http://schemas.openxmlformats.org/drawingml/2006/main" xmlns:r="http://schemas.openxmlformats.org/officeDocument/2006/relationships" xmlns:p="http://schemas.openxmlformats.org/presentationml/2006/main">
+  <p:cSld>
+    <p:spTree>
+      <p:nvGrpSpPr>
+        <p:cNvPr id="1" name=""/>
+        <p:cNvGrpSpPr/>
+        <p:nvPr/>
+      </p:nvGrpSpPr>
+      <p:grpSpPr>
+        <a:xfrm>
+          <a:off x="0" y="0"/>
+          <a:ext cx="0" cy="0"/>
+          <a:chOff x="0" y="0"/>
+          <a:chExt cx="0" cy="0"/>
+        </a:xfrm>
+      </p:grpSpPr>
+      <p:sp>
+        <p:nvSpPr>
+          <p:cNvPr id="2" name="Title 1">
+            <a:extLst>
+              <a:ext uri="{FF2B5EF4-FFF2-40B4-BE49-F238E27FC236}">
+                <a16:creationId xmlns:a16="http://schemas.microsoft.com/office/drawing/2014/main" id="{B1AC9C15-90E5-4304-8A55-B2A517ADB20D}"/>
+              </a:ext>
+            </a:extLst>
+          </p:cNvPr>
+          <p:cNvSpPr>
+            <a:spLocks noGrp="1"/>
+          </p:cNvSpPr>
+          <p:nvPr>
+            <p:ph type="title"/>
+          </p:nvPr>
+        </p:nvSpPr>
+        <p:spPr/>
+        <p:txBody>
+          <a:bodyPr/>
+          <a:lstStyle/>
+          <a:p>
+            <a:r>
+              <a:rPr lang="en-US" dirty="0"/>
+              <a:t>Questions of Interest</a:t>
+            </a:r>
+          </a:p>
+        </p:txBody>
+      </p:sp>
+      <p:graphicFrame>
+        <p:nvGraphicFramePr>
+          <p:cNvPr id="6" name="Table 5">
+            <a:extLst>
+              <a:ext uri="{FF2B5EF4-FFF2-40B4-BE49-F238E27FC236}">
+                <a16:creationId xmlns:a16="http://schemas.microsoft.com/office/drawing/2014/main" id="{3C91CE52-4B3C-42E5-8D33-725B2966A8FC}"/>
+              </a:ext>
+            </a:extLst>
+          </p:cNvPr>
+          <p:cNvGraphicFramePr>
+            <a:graphicFrameLocks noGrp="1"/>
+          </p:cNvGraphicFramePr>
+          <p:nvPr>
+            <p:extLst>
+              <p:ext uri="{D42A27DB-BD31-4B8C-83A1-F6EECF244321}">
+                <p14:modId xmlns:p14="http://schemas.microsoft.com/office/powerpoint/2010/main" val="1150766818"/>
+              </p:ext>
+            </p:extLst>
+          </p:nvPr>
+        </p:nvGraphicFramePr>
+        <p:xfrm>
+          <a:off x="457200" y="1812022"/>
+          <a:ext cx="6698609" cy="2575560"/>
+        </p:xfrm>
+        <a:graphic>
+          <a:graphicData uri="http://schemas.openxmlformats.org/drawingml/2006/table">
+            <a:tbl>
+              <a:tblPr firstRow="1" bandRow="1">
+                <a:tableStyleId>{2D5ABB26-0587-4C30-8999-92F81FD0307C}</a:tableStyleId>
+              </a:tblPr>
+              <a:tblGrid>
+                <a:gridCol w="5215261">
+                  <a:extLst>
+                    <a:ext uri="{9D8B030D-6E8A-4147-A177-3AD203B41FA5}">
+                      <a16:colId xmlns:a16="http://schemas.microsoft.com/office/drawing/2014/main" val="20000"/>
+                    </a:ext>
+                  </a:extLst>
+                </a:gridCol>
+                <a:gridCol w="1483348">
+                  <a:extLst>
+                    <a:ext uri="{9D8B030D-6E8A-4147-A177-3AD203B41FA5}">
+                      <a16:colId xmlns:a16="http://schemas.microsoft.com/office/drawing/2014/main" val="20001"/>
+                    </a:ext>
+                  </a:extLst>
+                </a:gridCol>
+              </a:tblGrid>
+              <a:tr h="313692">
+                <a:tc>
+                  <a:txBody>
+                    <a:bodyPr/>
+                    <a:lstStyle/>
+                    <a:p>
+                      <a:r>
+                        <a:rPr lang="en-US" sz="2000" b="1" i="0" kern="1200" cap="all" dirty="0">
+                          <a:solidFill>
+                            <a:schemeClr val="bg1">
+                              <a:lumMod val="50000"/>
+                            </a:schemeClr>
+                          </a:solidFill>
+                          <a:latin typeface="Calibri" panose="020F0502020204030204" pitchFamily="34" charset="0"/>
+                          <a:ea typeface="+mj-ea"/>
+                          <a:cs typeface="Calibri" panose="020F0502020204030204" pitchFamily="34" charset="0"/>
+                        </a:rPr>
+                        <a:t>TOPIC</a:t>
+                      </a:r>
+                    </a:p>
+                  </a:txBody>
+                  <a:tcPr marL="68580" marR="68580" marT="34290" marB="34290">
+                    <a:lnT w="12700" cap="flat" cmpd="sng" algn="ctr">
+                      <a:solidFill>
+                        <a:schemeClr val="bg2"/>
+                      </a:solidFill>
+                      <a:prstDash val="solid"/>
+                      <a:round/>
+                      <a:headEnd type="none" w="med" len="med"/>
+                      <a:tailEnd type="none" w="med" len="med"/>
+                    </a:lnT>
+                    <a:lnB w="12700" cap="flat" cmpd="sng" algn="ctr">
+                      <a:solidFill>
+                        <a:srgbClr val="FFC000"/>
+                      </a:solidFill>
+                      <a:prstDash val="solid"/>
+                      <a:round/>
+                      <a:headEnd type="none" w="med" len="med"/>
+                      <a:tailEnd type="none" w="med" len="med"/>
+                    </a:lnB>
+                  </a:tcPr>
+                </a:tc>
+                <a:tc>
+                  <a:txBody>
+                    <a:bodyPr/>
+                    <a:lstStyle/>
+                    <a:p>
+                      <a:pPr marL="0" algn="l" defTabSz="914400" rtl="0" eaLnBrk="1" latinLnBrk="0" hangingPunct="1"/>
+                      <a:r>
+                        <a:rPr lang="en-US" sz="2000" b="1" i="0" kern="1200" cap="all" dirty="0">
+                          <a:solidFill>
+                            <a:schemeClr val="bg1">
+                              <a:lumMod val="50000"/>
+                            </a:schemeClr>
+                          </a:solidFill>
+                          <a:latin typeface="Calibri" panose="020F0502020204030204" pitchFamily="34" charset="0"/>
+                          <a:ea typeface="+mj-ea"/>
+                          <a:cs typeface="Calibri" panose="020F0502020204030204" pitchFamily="34" charset="0"/>
+                        </a:rPr>
+                        <a:t>Time</a:t>
+                      </a:r>
+                    </a:p>
+                  </a:txBody>
+                  <a:tcPr marL="68580" marR="68580" marT="34290" marB="34290">
+                    <a:lnT w="12700" cap="flat" cmpd="sng" algn="ctr">
+                      <a:solidFill>
+                        <a:schemeClr val="bg2"/>
+                      </a:solidFill>
+                      <a:prstDash val="solid"/>
+                      <a:round/>
+                      <a:headEnd type="none" w="med" len="med"/>
+                      <a:tailEnd type="none" w="med" len="med"/>
+                    </a:lnT>
+                    <a:lnB w="12700" cap="flat" cmpd="sng" algn="ctr">
+                      <a:solidFill>
+                        <a:srgbClr val="FFC000"/>
+                      </a:solidFill>
+                      <a:prstDash val="solid"/>
+                      <a:round/>
+                      <a:headEnd type="none" w="med" len="med"/>
+                      <a:tailEnd type="none" w="med" len="med"/>
+                    </a:lnB>
+                  </a:tcPr>
+                </a:tc>
+                <a:extLst>
+                  <a:ext uri="{0D108BD9-81ED-4DB2-BD59-A6C34878D82A}">
+                    <a16:rowId xmlns:a16="http://schemas.microsoft.com/office/drawing/2014/main" val="10000"/>
+                  </a:ext>
+                </a:extLst>
+              </a:tr>
+              <a:tr h="1165860">
+                <a:tc>
+                  <a:txBody>
+                    <a:bodyPr/>
+                    <a:lstStyle/>
+                    <a:p>
+                      <a:pPr marL="0" indent="0">
+                        <a:buFont typeface="Arial" panose="020B0604020202020204" pitchFamily="34" charset="0"/>
+                        <a:buNone/>
+                      </a:pPr>
+                      <a:r>
+                        <a:rPr lang="en-US" sz="2000" b="1" baseline="0" dirty="0">
+                          <a:latin typeface="Calibri" panose="020F0502020204030204" pitchFamily="34" charset="0"/>
+                          <a:cs typeface="Calibri" panose="020F0502020204030204" pitchFamily="34" charset="0"/>
+                        </a:rPr>
+                        <a:t>Discovery</a:t>
+                      </a:r>
+                    </a:p>
+                    <a:p>
+                      <a:pPr marL="285750" marR="0" lvl="0" indent="-285750" algn="l" defTabSz="457200" rtl="0" eaLnBrk="1" fontAlgn="auto" latinLnBrk="0" hangingPunct="1">
+                        <a:lnSpc>
+                          <a:spcPct val="100000"/>
+                        </a:lnSpc>
+                        <a:spcBef>
+                          <a:spcPts val="0"/>
+                        </a:spcBef>
+                        <a:spcAft>
+                          <a:spcPts val="0"/>
+                        </a:spcAft>
+                        <a:buClrTx/>
+                        <a:buSzTx/>
+                        <a:buFont typeface="Arial" charset="0"/>
+                        <a:buChar char="•"/>
+                        <a:tabLst/>
+                        <a:defRPr/>
+                      </a:pPr>
+                      <a:r>
+                        <a:rPr lang="en-US" sz="2000" kern="1200" dirty="0">
+                          <a:solidFill>
+                            <a:schemeClr val="tx1"/>
+                          </a:solidFill>
+                          <a:latin typeface="+mn-lt"/>
+                          <a:ea typeface="+mn-ea"/>
+                          <a:cs typeface="+mn-cs"/>
+                        </a:rPr>
+                        <a:t>Brewery Count by State</a:t>
+                      </a:r>
+                    </a:p>
+                    <a:p>
+                      <a:pPr marL="285750" marR="0" lvl="0" indent="-285750" algn="l" defTabSz="457200" rtl="0" eaLnBrk="1" fontAlgn="auto" latinLnBrk="0" hangingPunct="1">
+                        <a:lnSpc>
+                          <a:spcPct val="100000"/>
+                        </a:lnSpc>
+                        <a:spcBef>
+                          <a:spcPts val="0"/>
+                        </a:spcBef>
+                        <a:spcAft>
+                          <a:spcPts val="0"/>
+                        </a:spcAft>
+                        <a:buClrTx/>
+                        <a:buSzTx/>
+                        <a:buFont typeface="Arial" charset="0"/>
+                        <a:buChar char="•"/>
+                        <a:tabLst/>
+                        <a:defRPr/>
+                      </a:pPr>
+                      <a:r>
+                        <a:rPr lang="en-US" sz="2000" kern="1200" dirty="0">
+                          <a:solidFill>
+                            <a:schemeClr val="tx1"/>
+                          </a:solidFill>
+                          <a:latin typeface="+mn-lt"/>
+                          <a:ea typeface="+mn-ea"/>
+                          <a:cs typeface="+mn-cs"/>
+                        </a:rPr>
+                        <a:t>Missing Values</a:t>
+                      </a:r>
+                    </a:p>
+                    <a:p>
+                      <a:pPr marL="285750" marR="0" lvl="0" indent="-285750" algn="l" defTabSz="457200" rtl="0" eaLnBrk="1" fontAlgn="auto" latinLnBrk="0" hangingPunct="1">
+                        <a:lnSpc>
+                          <a:spcPct val="100000"/>
+                        </a:lnSpc>
+                        <a:spcBef>
+                          <a:spcPts val="0"/>
+                        </a:spcBef>
+                        <a:spcAft>
+                          <a:spcPts val="0"/>
+                        </a:spcAft>
+                        <a:buClrTx/>
+                        <a:buSzTx/>
+                        <a:buFont typeface="Arial" charset="0"/>
+                        <a:buChar char="•"/>
+                        <a:tabLst/>
+                        <a:defRPr/>
+                      </a:pPr>
+                      <a:r>
+                        <a:rPr lang="en-US" sz="2000" kern="1200" dirty="0">
+                          <a:solidFill>
+                            <a:schemeClr val="tx1"/>
+                          </a:solidFill>
+                          <a:latin typeface="+mn-lt"/>
+                          <a:ea typeface="+mn-ea"/>
+                          <a:cs typeface="+mn-cs"/>
+                        </a:rPr>
+                        <a:t>Median ABV/IBU per State</a:t>
+                      </a:r>
+                    </a:p>
+                    <a:p>
+                      <a:pPr marL="285750" marR="0" lvl="0" indent="-285750" algn="l" defTabSz="457200" rtl="0" eaLnBrk="1" fontAlgn="auto" latinLnBrk="0" hangingPunct="1">
+                        <a:lnSpc>
+                          <a:spcPct val="100000"/>
+                        </a:lnSpc>
+                        <a:spcBef>
+                          <a:spcPts val="0"/>
+                        </a:spcBef>
+                        <a:spcAft>
+                          <a:spcPts val="0"/>
+                        </a:spcAft>
+                        <a:buClrTx/>
+                        <a:buSzTx/>
+                        <a:buFont typeface="Arial" charset="0"/>
+                        <a:buChar char="•"/>
+                        <a:tabLst/>
+                        <a:defRPr/>
+                      </a:pPr>
+                      <a:r>
+                        <a:rPr lang="en-US" sz="2000" kern="1200" dirty="0">
+                          <a:solidFill>
+                            <a:schemeClr val="tx1"/>
+                          </a:solidFill>
+                          <a:latin typeface="+mn-lt"/>
+                          <a:ea typeface="+mn-ea"/>
+                          <a:cs typeface="+mn-cs"/>
+                        </a:rPr>
+                        <a:t>Maximum Values</a:t>
+                      </a:r>
+                    </a:p>
+                    <a:p>
+                      <a:pPr marL="285750" marR="0" lvl="0" indent="-285750" algn="l" defTabSz="457200" rtl="0" eaLnBrk="1" fontAlgn="auto" latinLnBrk="0" hangingPunct="1">
+                        <a:lnSpc>
+                          <a:spcPct val="100000"/>
+                        </a:lnSpc>
+                        <a:spcBef>
+                          <a:spcPts val="0"/>
+                        </a:spcBef>
+                        <a:spcAft>
+                          <a:spcPts val="0"/>
+                        </a:spcAft>
+                        <a:buClrTx/>
+                        <a:buSzTx/>
+                        <a:buFont typeface="Arial" charset="0"/>
+                        <a:buChar char="•"/>
+                        <a:tabLst/>
+                        <a:defRPr/>
+                      </a:pPr>
+                      <a:r>
+                        <a:rPr lang="en-US" sz="2000" kern="1200" dirty="0">
+                          <a:solidFill>
+                            <a:schemeClr val="tx1"/>
+                          </a:solidFill>
+                          <a:latin typeface="+mn-lt"/>
+                          <a:ea typeface="+mn-ea"/>
+                          <a:cs typeface="+mn-cs"/>
+                        </a:rPr>
+                        <a:t>ABV Summary Statistics/ Distribution</a:t>
+                      </a:r>
+                    </a:p>
+                    <a:p>
+                      <a:pPr marL="285750" indent="-285750">
+                        <a:buFont typeface="Arial" charset="0"/>
+                        <a:buChar char="•"/>
+                      </a:pPr>
+                      <a:r>
+                        <a:rPr lang="en-US" sz="2000" kern="1200" dirty="0">
+                          <a:solidFill>
+                            <a:schemeClr val="tx1"/>
+                          </a:solidFill>
+                          <a:latin typeface="+mn-lt"/>
+                          <a:ea typeface="+mn-ea"/>
+                          <a:cs typeface="+mn-cs"/>
+                        </a:rPr>
+                        <a:t>IBU to ABU Relationship</a:t>
+                      </a:r>
+                    </a:p>
+                  </a:txBody>
+                  <a:tcPr marL="68580" marR="68580" marT="34290" marB="34290">
+                    <a:lnT w="12700" cap="flat" cmpd="sng" algn="ctr">
+                      <a:solidFill>
+                        <a:srgbClr val="FFC000"/>
+                      </a:solidFill>
+                      <a:prstDash val="solid"/>
+                      <a:round/>
+                      <a:headEnd type="none" w="med" len="med"/>
+                      <a:tailEnd type="none" w="med" len="med"/>
+                    </a:lnT>
+                    <a:lnB w="12700" cap="flat" cmpd="sng" algn="ctr">
+                      <a:solidFill>
+                        <a:srgbClr val="FFC000"/>
+                      </a:solidFill>
+                      <a:prstDash val="solid"/>
+                      <a:round/>
+                      <a:headEnd type="none" w="med" len="med"/>
+                      <a:tailEnd type="none" w="med" len="med"/>
+                    </a:lnB>
+                  </a:tcPr>
+                </a:tc>
+                <a:tc>
+                  <a:txBody>
+                    <a:bodyPr/>
+                    <a:lstStyle/>
+                    <a:p>
+                      <a:r>
+                        <a:rPr lang="en-US" sz="2000" baseline="0" dirty="0">
+                          <a:latin typeface="Calibri" panose="020F0502020204030204" pitchFamily="34" charset="0"/>
+                          <a:cs typeface="Calibri" panose="020F0502020204030204" pitchFamily="34" charset="0"/>
+                        </a:rPr>
+                        <a:t>7 minutes</a:t>
+                      </a:r>
+                      <a:endParaRPr lang="en-US" sz="2000" dirty="0">
+                        <a:latin typeface="Calibri" panose="020F0502020204030204" pitchFamily="34" charset="0"/>
+                        <a:cs typeface="Calibri" panose="020F0502020204030204" pitchFamily="34" charset="0"/>
+                      </a:endParaRPr>
+                    </a:p>
+                  </a:txBody>
+                  <a:tcPr marL="68580" marR="68580" marT="34290" marB="34290">
+                    <a:lnT w="12700" cap="flat" cmpd="sng" algn="ctr">
+                      <a:solidFill>
+                        <a:srgbClr val="FFC000"/>
+                      </a:solidFill>
+                      <a:prstDash val="solid"/>
+                      <a:round/>
+                      <a:headEnd type="none" w="med" len="med"/>
+                      <a:tailEnd type="none" w="med" len="med"/>
+                    </a:lnT>
+                    <a:lnB w="12700" cap="flat" cmpd="sng" algn="ctr">
+                      <a:solidFill>
+                        <a:srgbClr val="FFC000"/>
+                      </a:solidFill>
+                      <a:prstDash val="solid"/>
+                      <a:round/>
+                      <a:headEnd type="none" w="med" len="med"/>
+                      <a:tailEnd type="none" w="med" len="med"/>
+                    </a:lnB>
+                  </a:tcPr>
+                </a:tc>
+                <a:extLst>
+                  <a:ext uri="{0D108BD9-81ED-4DB2-BD59-A6C34878D82A}">
+                    <a16:rowId xmlns:a16="http://schemas.microsoft.com/office/drawing/2014/main" val="10003"/>
+                  </a:ext>
+                </a:extLst>
+              </a:tr>
+            </a:tbl>
+          </a:graphicData>
+        </a:graphic>
+      </p:graphicFrame>
+    </p:spTree>
+    <p:extLst>
+      <p:ext uri="{BB962C8B-B14F-4D97-AF65-F5344CB8AC3E}">
+        <p14:creationId xmlns:p14="http://schemas.microsoft.com/office/powerpoint/2010/main" val="1654918714"/>
+      </p:ext>
+    </p:extLst>
+  </p:cSld>
+  <p:clrMapOvr>
+    <a:masterClrMapping/>
+  </p:clrMapOvr>
+</p:sld>
+</file>
+
 <file path=ppt/slides/slide4.xml><?xml version="1.0" encoding="utf-8"?>
+<p:sld xmlns:a="http://schemas.openxmlformats.org/drawingml/2006/main" xmlns:r="http://schemas.openxmlformats.org/officeDocument/2006/relationships" xmlns:p="http://schemas.openxmlformats.org/presentationml/2006/main">
+  <p:cSld>
+    <p:spTree>
+      <p:nvGrpSpPr>
+        <p:cNvPr id="1" name=""/>
+        <p:cNvGrpSpPr/>
+        <p:nvPr/>
+      </p:nvGrpSpPr>
+      <p:grpSpPr>
+        <a:xfrm>
+          <a:off x="0" y="0"/>
+          <a:ext cx="0" cy="0"/>
+          <a:chOff x="0" y="0"/>
+          <a:chExt cx="0" cy="0"/>
+        </a:xfrm>
+      </p:grpSpPr>
+      <p:sp>
+        <p:nvSpPr>
+          <p:cNvPr id="2" name="Title 1">
+            <a:extLst>
+              <a:ext uri="{FF2B5EF4-FFF2-40B4-BE49-F238E27FC236}">
+                <a16:creationId xmlns:a16="http://schemas.microsoft.com/office/drawing/2014/main" id="{5B931770-76C9-F749-9B7D-08A4A1F13896}"/>
+              </a:ext>
+            </a:extLst>
+          </p:cNvPr>
+          <p:cNvSpPr>
+            <a:spLocks noGrp="1"/>
+          </p:cNvSpPr>
+          <p:nvPr>
+            <p:ph type="title"/>
+          </p:nvPr>
+        </p:nvSpPr>
+        <p:spPr>
+          <a:xfrm>
+            <a:off x="0" y="228600"/>
+            <a:ext cx="9144000" cy="1143000"/>
+          </a:xfrm>
+        </p:spPr>
+        <p:txBody>
+          <a:bodyPr/>
+          <a:lstStyle/>
+          <a:p>
+            <a:r>
+              <a:rPr lang="en-US" dirty="0"/>
+              <a:t>Brewery Count by State</a:t>
+            </a:r>
+          </a:p>
+        </p:txBody>
+      </p:sp>
+      <p:sp>
+        <p:nvSpPr>
+          <p:cNvPr id="5" name="Content Placeholder 4">
+            <a:extLst>
+              <a:ext uri="{FF2B5EF4-FFF2-40B4-BE49-F238E27FC236}">
+                <a16:creationId xmlns:a16="http://schemas.microsoft.com/office/drawing/2014/main" id="{375CDB98-7F05-41AD-9F29-81E3D0CFBEFF}"/>
+              </a:ext>
+            </a:extLst>
+          </p:cNvPr>
+          <p:cNvSpPr>
+            <a:spLocks noGrp="1"/>
+          </p:cNvSpPr>
+          <p:nvPr>
+            <p:ph idx="1"/>
+          </p:nvPr>
+        </p:nvSpPr>
+        <p:spPr>
+          <a:xfrm>
+            <a:off x="457199" y="1627905"/>
+            <a:ext cx="8229600" cy="4854011"/>
+          </a:xfrm>
+        </p:spPr>
+        <p:txBody>
+          <a:bodyPr/>
+          <a:lstStyle/>
+          <a:p>
+            <a:r>
+              <a:rPr lang="en-US" dirty="0"/>
+              <a:t>How many breweries are present in each state?</a:t>
+            </a:r>
+          </a:p>
+          <a:p>
+            <a:endParaRPr lang="en-US" dirty="0"/>
+          </a:p>
+          <a:p>
+            <a:endParaRPr lang="en-US" dirty="0"/>
+          </a:p>
+          <a:p>
+            <a:endParaRPr lang="en-US" dirty="0"/>
+          </a:p>
+          <a:p>
+            <a:endParaRPr lang="en-US" dirty="0"/>
+          </a:p>
+          <a:p>
+            <a:endParaRPr lang="en-US" dirty="0"/>
+          </a:p>
+          <a:p>
+            <a:pPr marL="0" indent="0">
+              <a:buNone/>
+            </a:pPr>
+            <a:endParaRPr lang="en-US" sz="1600" i="1" dirty="0"/>
+          </a:p>
+          <a:p>
+            <a:pPr marL="0" indent="0">
+              <a:buNone/>
+            </a:pPr>
+            <a:r>
+              <a:rPr lang="en-US" sz="1600" i="1" dirty="0"/>
+              <a:t>Note that all 50 states have at least one brewery listed, including the District of Columbia (DC), for a total of 51.</a:t>
+            </a:r>
+          </a:p>
+          <a:p>
+            <a:endParaRPr lang="en-US" dirty="0"/>
+          </a:p>
+          <a:p>
+            <a:pPr marL="0" indent="0">
+              <a:buNone/>
+            </a:pPr>
+            <a:endParaRPr lang="en-US" dirty="0"/>
+          </a:p>
+        </p:txBody>
+      </p:sp>
+      <p:pic>
+        <p:nvPicPr>
+          <p:cNvPr id="6" name="Picture 5">
+            <a:extLst>
+              <a:ext uri="{FF2B5EF4-FFF2-40B4-BE49-F238E27FC236}">
+                <a16:creationId xmlns:a16="http://schemas.microsoft.com/office/drawing/2014/main" id="{FA6EA71A-F156-4C3F-871E-0BFCAF4E8BC9}"/>
+              </a:ext>
+            </a:extLst>
+          </p:cNvPr>
+          <p:cNvPicPr>
+            <a:picLocks noChangeAspect="1"/>
+          </p:cNvPicPr>
+          <p:nvPr/>
+        </p:nvPicPr>
+        <p:blipFill>
+          <a:blip r:embed="rId2"/>
+          <a:stretch>
+            <a:fillRect/>
+          </a:stretch>
+        </p:blipFill>
+        <p:spPr>
+          <a:xfrm>
+            <a:off x="178367" y="3004462"/>
+            <a:ext cx="4393633" cy="2532180"/>
+          </a:xfrm>
+          <a:prstGeom prst="rect">
+            <a:avLst/>
+          </a:prstGeom>
+        </p:spPr>
+      </p:pic>
+      <p:pic>
+        <p:nvPicPr>
+          <p:cNvPr id="9" name="Picture 8">
+            <a:extLst>
+              <a:ext uri="{FF2B5EF4-FFF2-40B4-BE49-F238E27FC236}">
+                <a16:creationId xmlns:a16="http://schemas.microsoft.com/office/drawing/2014/main" id="{D0727BCD-80BC-4F1E-9197-C40E51192ADD}"/>
+              </a:ext>
+            </a:extLst>
+          </p:cNvPr>
+          <p:cNvPicPr>
+            <a:picLocks noChangeAspect="1"/>
+          </p:cNvPicPr>
+          <p:nvPr/>
+        </p:nvPicPr>
+        <p:blipFill>
+          <a:blip r:embed="rId3"/>
+          <a:stretch>
+            <a:fillRect/>
+          </a:stretch>
+        </p:blipFill>
+        <p:spPr>
+          <a:xfrm>
+            <a:off x="4612979" y="3004462"/>
+            <a:ext cx="4352652" cy="2532180"/>
+          </a:xfrm>
+          <a:prstGeom prst="rect">
+            <a:avLst/>
+          </a:prstGeom>
+        </p:spPr>
+      </p:pic>
+    </p:spTree>
+    <p:extLst>
+      <p:ext uri="{BB962C8B-B14F-4D97-AF65-F5344CB8AC3E}">
+        <p14:creationId xmlns:p14="http://schemas.microsoft.com/office/powerpoint/2010/main" val="3016725513"/>
+      </p:ext>
+    </p:extLst>
+  </p:cSld>
+  <p:clrMapOvr>
+    <a:masterClrMapping/>
+  </p:clrMapOvr>
+</p:sld>
+</file>
+
+<file path=ppt/slides/slide5.xml><?xml version="1.0" encoding="utf-8"?>
 <p:sld xmlns:a="http://schemas.openxmlformats.org/drawingml/2006/main" xmlns:r="http://schemas.openxmlformats.org/officeDocument/2006/relationships" xmlns:p="http://schemas.openxmlformats.org/presentationml/2006/main">
   <p:cSld>
     <p:spTree>
@@ -3441,193 +4569,6 @@
 </p:sld>
 </file>
 
-<file path=ppt/slides/slide5.xml><?xml version="1.0" encoding="utf-8"?>
-<p:sld xmlns:a="http://schemas.openxmlformats.org/drawingml/2006/main" xmlns:r="http://schemas.openxmlformats.org/officeDocument/2006/relationships" xmlns:p="http://schemas.openxmlformats.org/presentationml/2006/main">
-  <p:cSld>
-    <p:spTree>
-      <p:nvGrpSpPr>
-        <p:cNvPr id="1" name=""/>
-        <p:cNvGrpSpPr/>
-        <p:nvPr/>
-      </p:nvGrpSpPr>
-      <p:grpSpPr>
-        <a:xfrm>
-          <a:off x="0" y="0"/>
-          <a:ext cx="0" cy="0"/>
-          <a:chOff x="0" y="0"/>
-          <a:chExt cx="0" cy="0"/>
-        </a:xfrm>
-      </p:grpSpPr>
-      <p:sp>
-        <p:nvSpPr>
-          <p:cNvPr id="2" name="Title 1">
-            <a:extLst>
-              <a:ext uri="{FF2B5EF4-FFF2-40B4-BE49-F238E27FC236}">
-                <a16:creationId xmlns:a16="http://schemas.microsoft.com/office/drawing/2014/main" id="{5B931770-76C9-F749-9B7D-08A4A1F13896}"/>
-              </a:ext>
-            </a:extLst>
-          </p:cNvPr>
-          <p:cNvSpPr>
-            <a:spLocks noGrp="1"/>
-          </p:cNvSpPr>
-          <p:nvPr>
-            <p:ph type="title"/>
-          </p:nvPr>
-        </p:nvSpPr>
-        <p:spPr>
-          <a:xfrm>
-            <a:off x="0" y="228600"/>
-            <a:ext cx="9144000" cy="1143000"/>
-          </a:xfrm>
-        </p:spPr>
-        <p:txBody>
-          <a:bodyPr/>
-          <a:lstStyle/>
-          <a:p>
-            <a:r>
-              <a:rPr lang="en-US" dirty="0"/>
-              <a:t>Median ABV per State</a:t>
-            </a:r>
-          </a:p>
-        </p:txBody>
-      </p:sp>
-      <p:sp>
-        <p:nvSpPr>
-          <p:cNvPr id="5" name="Content Placeholder 4">
-            <a:extLst>
-              <a:ext uri="{FF2B5EF4-FFF2-40B4-BE49-F238E27FC236}">
-                <a16:creationId xmlns:a16="http://schemas.microsoft.com/office/drawing/2014/main" id="{375CDB98-7F05-41AD-9F29-81E3D0CFBEFF}"/>
-              </a:ext>
-            </a:extLst>
-          </p:cNvPr>
-          <p:cNvSpPr>
-            <a:spLocks noGrp="1"/>
-          </p:cNvSpPr>
-          <p:nvPr>
-            <p:ph idx="1"/>
-          </p:nvPr>
-        </p:nvSpPr>
-        <p:spPr>
-          <a:xfrm>
-            <a:off x="457199" y="1627905"/>
-            <a:ext cx="8229600" cy="4854011"/>
-          </a:xfrm>
-        </p:spPr>
-        <p:txBody>
-          <a:bodyPr/>
-          <a:lstStyle/>
-          <a:p>
-            <a:endParaRPr lang="en-US" dirty="0"/>
-          </a:p>
-          <a:p>
-            <a:endParaRPr lang="en-US" dirty="0"/>
-          </a:p>
-          <a:p>
-            <a:endParaRPr lang="en-US" dirty="0"/>
-          </a:p>
-          <a:p>
-            <a:endParaRPr lang="en-US" dirty="0"/>
-          </a:p>
-          <a:p>
-            <a:endParaRPr lang="en-US" dirty="0"/>
-          </a:p>
-          <a:p>
-            <a:pPr marL="0" indent="0">
-              <a:buNone/>
-            </a:pPr>
-            <a:endParaRPr lang="en-US" sz="1600" i="1" dirty="0"/>
-          </a:p>
-          <a:p>
-            <a:pPr marL="0" indent="0">
-              <a:buNone/>
-            </a:pPr>
-            <a:endParaRPr lang="en-US" dirty="0"/>
-          </a:p>
-        </p:txBody>
-      </p:sp>
-      <p:sp>
-        <p:nvSpPr>
-          <p:cNvPr id="4" name="Rectangle 3">
-            <a:extLst>
-              <a:ext uri="{FF2B5EF4-FFF2-40B4-BE49-F238E27FC236}">
-                <a16:creationId xmlns:a16="http://schemas.microsoft.com/office/drawing/2014/main" id="{6608DBBE-C619-4CEB-9667-544ECD27A105}"/>
-              </a:ext>
-            </a:extLst>
-          </p:cNvPr>
-          <p:cNvSpPr/>
-          <p:nvPr/>
-        </p:nvSpPr>
-        <p:spPr>
-          <a:xfrm>
-            <a:off x="207115" y="5616258"/>
-            <a:ext cx="9062884" cy="923330"/>
-          </a:xfrm>
-          <a:prstGeom prst="rect">
-            <a:avLst/>
-          </a:prstGeom>
-        </p:spPr>
-        <p:txBody>
-          <a:bodyPr wrap="square">
-            <a:spAutoFit/>
-          </a:bodyPr>
-          <a:lstStyle/>
-          <a:p>
-            <a:r>
-              <a:rPr lang="en-US" i="1" dirty="0"/>
-              <a:t>From visually inspecting the graph, most states have a relatively close spread.  The summary statistics show that 50% of the available data fall within the interval </a:t>
-            </a:r>
-          </a:p>
-          <a:p>
-            <a:r>
-              <a:rPr lang="en-US" i="1" dirty="0"/>
-              <a:t>(0.05 to 0.067)</a:t>
-            </a:r>
-          </a:p>
-        </p:txBody>
-      </p:sp>
-      <p:pic>
-        <p:nvPicPr>
-          <p:cNvPr id="7" name="Picture 6" descr="A screenshot of a cell phone&#10;&#10;Description automatically generated">
-            <a:extLst>
-              <a:ext uri="{FF2B5EF4-FFF2-40B4-BE49-F238E27FC236}">
-                <a16:creationId xmlns:a16="http://schemas.microsoft.com/office/drawing/2014/main" id="{4A45DD21-7BF6-489C-9C57-8E649F4885DC}"/>
-              </a:ext>
-            </a:extLst>
-          </p:cNvPr>
-          <p:cNvPicPr>
-            <a:picLocks noChangeAspect="1"/>
-          </p:cNvPicPr>
-          <p:nvPr/>
-        </p:nvPicPr>
-        <p:blipFill>
-          <a:blip r:embed="rId2"/>
-          <a:stretch>
-            <a:fillRect/>
-          </a:stretch>
-        </p:blipFill>
-        <p:spPr>
-          <a:xfrm>
-            <a:off x="1237784" y="1436242"/>
-            <a:ext cx="6668431" cy="4115374"/>
-          </a:xfrm>
-          <a:prstGeom prst="rect">
-            <a:avLst/>
-          </a:prstGeom>
-        </p:spPr>
-      </p:pic>
-    </p:spTree>
-    <p:extLst>
-      <p:ext uri="{BB962C8B-B14F-4D97-AF65-F5344CB8AC3E}">
-        <p14:creationId xmlns:p14="http://schemas.microsoft.com/office/powerpoint/2010/main" val="3119558950"/>
-      </p:ext>
-    </p:extLst>
-  </p:cSld>
-  <p:clrMapOvr>
-    <a:masterClrMapping/>
-  </p:clrMapOvr>
-</p:sld>
-</file>
-
 <file path=ppt/slides/slide6.xml><?xml version="1.0" encoding="utf-8"?>
 <p:sld xmlns:a="http://schemas.openxmlformats.org/drawingml/2006/main" xmlns:r="http://schemas.openxmlformats.org/officeDocument/2006/relationships" xmlns:p="http://schemas.openxmlformats.org/presentationml/2006/main">
   <p:cSld>
@@ -3673,7 +4614,7 @@
           <a:p>
             <a:r>
               <a:rPr lang="en-US" dirty="0"/>
-              <a:t>Median IBU per State</a:t>
+              <a:t>Median ABV per State</a:t>
             </a:r>
           </a:p>
         </p:txBody>
@@ -3734,10 +4675,10 @@
       </p:sp>
       <p:sp>
         <p:nvSpPr>
-          <p:cNvPr id="6" name="Rectangle 5">
+          <p:cNvPr id="4" name="Rectangle 3">
             <a:extLst>
               <a:ext uri="{FF2B5EF4-FFF2-40B4-BE49-F238E27FC236}">
-                <a16:creationId xmlns:a16="http://schemas.microsoft.com/office/drawing/2014/main" id="{F8B83E26-92F5-4B23-ACBB-69BAFA025801}"/>
+                <a16:creationId xmlns:a16="http://schemas.microsoft.com/office/drawing/2014/main" id="{6608DBBE-C619-4CEB-9667-544ECD27A105}"/>
               </a:ext>
             </a:extLst>
           </p:cNvPr>
@@ -3746,8 +4687,8 @@
         </p:nvSpPr>
         <p:spPr>
           <a:xfrm>
-            <a:off x="207115" y="5964581"/>
-            <a:ext cx="9062884" cy="646331"/>
+            <a:off x="207115" y="5616258"/>
+            <a:ext cx="9062884" cy="923330"/>
           </a:xfrm>
           <a:prstGeom prst="rect">
             <a:avLst/>
@@ -3761,7 +4702,13 @@
           <a:p>
             <a:r>
               <a:rPr lang="en-US" i="1" dirty="0"/>
-              <a:t>There is much more variation in the IBU data, possibly due to missing values or regional preferences.</a:t>
+              <a:t>From visually inspecting the graph, most states have a relatively close spread.  The summary statistics show that 50% of the available data fall within the interval </a:t>
+            </a:r>
+          </a:p>
+          <a:p>
+            <a:r>
+              <a:rPr lang="en-US" i="1" dirty="0"/>
+              <a:t>(0.05 to 0.067)</a:t>
             </a:r>
           </a:p>
         </p:txBody>
@@ -3771,7 +4718,7 @@
           <p:cNvPr id="7" name="Picture 6" descr="A screenshot of a cell phone&#10;&#10;Description automatically generated">
             <a:extLst>
               <a:ext uri="{FF2B5EF4-FFF2-40B4-BE49-F238E27FC236}">
-                <a16:creationId xmlns:a16="http://schemas.microsoft.com/office/drawing/2014/main" id="{FF85213C-4012-4ADB-A556-14903EDF1BD7}"/>
+                <a16:creationId xmlns:a16="http://schemas.microsoft.com/office/drawing/2014/main" id="{4A45DD21-7BF6-489C-9C57-8E649F4885DC}"/>
               </a:ext>
             </a:extLst>
           </p:cNvPr>
@@ -3788,7 +4735,7 @@
         </p:blipFill>
         <p:spPr>
           <a:xfrm>
-            <a:off x="1237783" y="1610403"/>
+            <a:off x="1237784" y="1436242"/>
             <a:ext cx="6668431" cy="4115374"/>
           </a:xfrm>
           <a:prstGeom prst="rect">
@@ -3799,7 +4746,7 @@
     </p:spTree>
     <p:extLst>
       <p:ext uri="{BB962C8B-B14F-4D97-AF65-F5344CB8AC3E}">
-        <p14:creationId xmlns:p14="http://schemas.microsoft.com/office/powerpoint/2010/main" val="2253749982"/>
+        <p14:creationId xmlns:p14="http://schemas.microsoft.com/office/powerpoint/2010/main" val="3119558950"/>
       </p:ext>
     </p:extLst>
   </p:cSld>
@@ -3854,7 +4801,7 @@
           <a:p>
             <a:r>
               <a:rPr lang="en-US" dirty="0"/>
-              <a:t>Maximum Values by State (ABV)</a:t>
+              <a:t>Median IBU per State</a:t>
             </a:r>
           </a:p>
         </p:txBody>
@@ -3885,18 +4832,6 @@
           <a:bodyPr/>
           <a:lstStyle/>
           <a:p>
-            <a:r>
-              <a:rPr lang="en-US" dirty="0"/>
-              <a:t>There are different measures of center, etc.. that might be useful in determining state trends.</a:t>
-            </a:r>
-          </a:p>
-          <a:p>
-            <a:pPr marL="0" indent="0">
-              <a:buNone/>
-            </a:pPr>
-            <a:endParaRPr lang="en-US" dirty="0"/>
-          </a:p>
-          <a:p>
             <a:endParaRPr lang="en-US" dirty="0"/>
           </a:p>
           <a:p>
@@ -3923,20 +4858,48 @@
             </a:pPr>
             <a:endParaRPr lang="en-US" dirty="0"/>
           </a:p>
-          <a:p>
-            <a:pPr marL="0" indent="0">
-              <a:buNone/>
-            </a:pPr>
-            <a:endParaRPr lang="en-US" dirty="0"/>
+        </p:txBody>
+      </p:sp>
+      <p:sp>
+        <p:nvSpPr>
+          <p:cNvPr id="6" name="Rectangle 5">
+            <a:extLst>
+              <a:ext uri="{FF2B5EF4-FFF2-40B4-BE49-F238E27FC236}">
+                <a16:creationId xmlns:a16="http://schemas.microsoft.com/office/drawing/2014/main" id="{F8B83E26-92F5-4B23-ACBB-69BAFA025801}"/>
+              </a:ext>
+            </a:extLst>
+          </p:cNvPr>
+          <p:cNvSpPr/>
+          <p:nvPr/>
+        </p:nvSpPr>
+        <p:spPr>
+          <a:xfrm>
+            <a:off x="207115" y="5964581"/>
+            <a:ext cx="9062884" cy="646331"/>
+          </a:xfrm>
+          <a:prstGeom prst="rect">
+            <a:avLst/>
+          </a:prstGeom>
+        </p:spPr>
+        <p:txBody>
+          <a:bodyPr wrap="square">
+            <a:spAutoFit/>
+          </a:bodyPr>
+          <a:lstStyle/>
+          <a:p>
+            <a:r>
+              <a:rPr lang="en-US" i="1" dirty="0"/>
+              <a:t>There is much more variation in the IBU data, possibly due to missing values or regional preferences.</a:t>
+            </a:r>
           </a:p>
         </p:txBody>
       </p:sp>
       <p:pic>
         <p:nvPicPr>
-          <p:cNvPr id="3" name="Picture 2">
+          <p:cNvPr id="7" name="Picture 6" descr="A screenshot of a cell phone&#10;&#10;Description automatically generated">
             <a:extLst>
               <a:ext uri="{FF2B5EF4-FFF2-40B4-BE49-F238E27FC236}">
-                <a16:creationId xmlns:a16="http://schemas.microsoft.com/office/drawing/2014/main" id="{2D0A25C9-0D7C-4888-B455-2DD2DCD8ED53}"/>
+                <a16:creationId xmlns:a16="http://schemas.microsoft.com/office/drawing/2014/main" id="{FF85213C-4012-4ADB-A556-14903EDF1BD7}"/>
               </a:ext>
             </a:extLst>
           </p:cNvPr>
@@ -3953,52 +4916,18 @@
         </p:blipFill>
         <p:spPr>
           <a:xfrm>
-            <a:off x="1948476" y="3398607"/>
-            <a:ext cx="5438775" cy="2657475"/>
+            <a:off x="1237783" y="1610403"/>
+            <a:ext cx="6668431" cy="4115374"/>
           </a:xfrm>
           <a:prstGeom prst="rect">
             <a:avLst/>
           </a:prstGeom>
         </p:spPr>
       </p:pic>
-      <p:sp>
-        <p:nvSpPr>
-          <p:cNvPr id="7" name="Rectangle 6">
-            <a:extLst>
-              <a:ext uri="{FF2B5EF4-FFF2-40B4-BE49-F238E27FC236}">
-                <a16:creationId xmlns:a16="http://schemas.microsoft.com/office/drawing/2014/main" id="{5958EAC4-08F2-4945-9F0D-E088897A9830}"/>
-              </a:ext>
-            </a:extLst>
-          </p:cNvPr>
-          <p:cNvSpPr/>
-          <p:nvPr/>
-        </p:nvSpPr>
-        <p:spPr>
-          <a:xfrm>
-            <a:off x="1887793" y="6125638"/>
-            <a:ext cx="5810866" cy="369332"/>
-          </a:xfrm>
-          <a:prstGeom prst="rect">
-            <a:avLst/>
-          </a:prstGeom>
-        </p:spPr>
-        <p:txBody>
-          <a:bodyPr wrap="square">
-            <a:spAutoFit/>
-          </a:bodyPr>
-          <a:lstStyle/>
-          <a:p>
-            <a:r>
-              <a:rPr lang="en-US" i="1" dirty="0"/>
-              <a:t>Depending on the statistic of interest, the answer varies</a:t>
-            </a:r>
-          </a:p>
-        </p:txBody>
-      </p:sp>
     </p:spTree>
     <p:extLst>
       <p:ext uri="{BB962C8B-B14F-4D97-AF65-F5344CB8AC3E}">
-        <p14:creationId xmlns:p14="http://schemas.microsoft.com/office/powerpoint/2010/main" val="622800655"/>
+        <p14:creationId xmlns:p14="http://schemas.microsoft.com/office/powerpoint/2010/main" val="2253749982"/>
       </p:ext>
     </p:extLst>
   </p:cSld>
@@ -4053,7 +4982,7 @@
           <a:p>
             <a:r>
               <a:rPr lang="en-US" dirty="0"/>
-              <a:t>Maximum Values by State (IBU)</a:t>
+              <a:t>Maximum Values by State (ABV)</a:t>
             </a:r>
           </a:p>
         </p:txBody>
@@ -4086,7 +5015,7 @@
           <a:p>
             <a:r>
               <a:rPr lang="en-US" dirty="0"/>
-              <a:t>Similar differences can be seen across the IBU statistics</a:t>
+              <a:t>There are different measures of center, etc.. that might be useful in determining state trends.</a:t>
             </a:r>
           </a:p>
           <a:p>
@@ -4135,7 +5064,7 @@
           <p:cNvPr id="3" name="Picture 2">
             <a:extLst>
               <a:ext uri="{FF2B5EF4-FFF2-40B4-BE49-F238E27FC236}">
-                <a16:creationId xmlns:a16="http://schemas.microsoft.com/office/drawing/2014/main" id="{C9BE29F8-D755-46CA-9143-78027D80052F}"/>
+                <a16:creationId xmlns:a16="http://schemas.microsoft.com/office/drawing/2014/main" id="{2D0A25C9-0D7C-4888-B455-2DD2DCD8ED53}"/>
               </a:ext>
             </a:extLst>
           </p:cNvPr>
@@ -4152,18 +5081,52 @@
         </p:blipFill>
         <p:spPr>
           <a:xfrm>
-            <a:off x="2505992" y="3361403"/>
-            <a:ext cx="4132015" cy="1868692"/>
+            <a:off x="1948476" y="3398607"/>
+            <a:ext cx="5438775" cy="2657475"/>
           </a:xfrm>
           <a:prstGeom prst="rect">
             <a:avLst/>
           </a:prstGeom>
         </p:spPr>
       </p:pic>
+      <p:sp>
+        <p:nvSpPr>
+          <p:cNvPr id="7" name="Rectangle 6">
+            <a:extLst>
+              <a:ext uri="{FF2B5EF4-FFF2-40B4-BE49-F238E27FC236}">
+                <a16:creationId xmlns:a16="http://schemas.microsoft.com/office/drawing/2014/main" id="{5958EAC4-08F2-4945-9F0D-E088897A9830}"/>
+              </a:ext>
+            </a:extLst>
+          </p:cNvPr>
+          <p:cNvSpPr/>
+          <p:nvPr/>
+        </p:nvSpPr>
+        <p:spPr>
+          <a:xfrm>
+            <a:off x="1887793" y="6125638"/>
+            <a:ext cx="5810866" cy="369332"/>
+          </a:xfrm>
+          <a:prstGeom prst="rect">
+            <a:avLst/>
+          </a:prstGeom>
+        </p:spPr>
+        <p:txBody>
+          <a:bodyPr wrap="square">
+            <a:spAutoFit/>
+          </a:bodyPr>
+          <a:lstStyle/>
+          <a:p>
+            <a:r>
+              <a:rPr lang="en-US" i="1" dirty="0"/>
+              <a:t>Depending on the statistic of interest, the answer varies</a:t>
+            </a:r>
+          </a:p>
+        </p:txBody>
+      </p:sp>
     </p:spTree>
     <p:extLst>
       <p:ext uri="{BB962C8B-B14F-4D97-AF65-F5344CB8AC3E}">
-        <p14:creationId xmlns:p14="http://schemas.microsoft.com/office/powerpoint/2010/main" val="724258878"/>
+        <p14:creationId xmlns:p14="http://schemas.microsoft.com/office/powerpoint/2010/main" val="622800655"/>
       </p:ext>
     </p:extLst>
   </p:cSld>
@@ -4218,7 +5181,7 @@
           <a:p>
             <a:r>
               <a:rPr lang="en-US" dirty="0"/>
-              <a:t>Summary Statistics (ABV)</a:t>
+              <a:t>Maximum Values by State (IBU)</a:t>
             </a:r>
           </a:p>
         </p:txBody>
@@ -4241,8 +5204,8 @@
         </p:nvSpPr>
         <p:spPr>
           <a:xfrm>
-            <a:off x="243347" y="1555954"/>
-            <a:ext cx="8155857" cy="5014451"/>
+            <a:off x="457199" y="1627905"/>
+            <a:ext cx="8229600" cy="4854011"/>
           </a:xfrm>
         </p:spPr>
         <p:txBody>
@@ -4250,8 +5213,8 @@
           <a:lstStyle/>
           <a:p>
             <a:r>
-              <a:rPr lang="en-US" sz="2800" dirty="0"/>
-              <a:t>The distribution of the ABV data is slightly right skewed, with most values falling within ~0.014 units of the mean of ~0.06.</a:t>
+              <a:rPr lang="en-US" dirty="0"/>
+              <a:t>Similar differences can be seen across the IBU statistics</a:t>
             </a:r>
           </a:p>
           <a:p>
@@ -4297,10 +5260,10 @@
       </p:sp>
       <p:pic>
         <p:nvPicPr>
-          <p:cNvPr id="6" name="Picture 5">
+          <p:cNvPr id="3" name="Picture 2">
             <a:extLst>
               <a:ext uri="{FF2B5EF4-FFF2-40B4-BE49-F238E27FC236}">
-                <a16:creationId xmlns:a16="http://schemas.microsoft.com/office/drawing/2014/main" id="{4C2EFC3A-6257-4A76-B439-81CC45AA057C}"/>
+                <a16:creationId xmlns:a16="http://schemas.microsoft.com/office/drawing/2014/main" id="{C9BE29F8-D755-46CA-9143-78027D80052F}"/>
               </a:ext>
             </a:extLst>
           </p:cNvPr>
@@ -4317,38 +5280,8 @@
         </p:blipFill>
         <p:spPr>
           <a:xfrm>
-            <a:off x="5236947" y="3429000"/>
-            <a:ext cx="3534655" cy="2250051"/>
-          </a:xfrm>
-          <a:prstGeom prst="rect">
-            <a:avLst/>
-          </a:prstGeom>
-        </p:spPr>
-      </p:pic>
-      <p:pic>
-        <p:nvPicPr>
-          <p:cNvPr id="7" name="Picture 6" descr="A screenshot of a cell phone&#10;&#10;Description automatically generated">
-            <a:extLst>
-              <a:ext uri="{FF2B5EF4-FFF2-40B4-BE49-F238E27FC236}">
-                <a16:creationId xmlns:a16="http://schemas.microsoft.com/office/drawing/2014/main" id="{CD2B4A56-248D-4CF6-86C1-3EC203AB1528}"/>
-              </a:ext>
-            </a:extLst>
-          </p:cNvPr>
-          <p:cNvPicPr>
-            <a:picLocks noChangeAspect="1"/>
-          </p:cNvPicPr>
-          <p:nvPr/>
-        </p:nvPicPr>
-        <p:blipFill>
-          <a:blip r:embed="rId3"/>
-          <a:stretch>
-            <a:fillRect/>
-          </a:stretch>
-        </p:blipFill>
-        <p:spPr>
-          <a:xfrm>
-            <a:off x="122235" y="3304509"/>
-            <a:ext cx="4742314" cy="2926685"/>
+            <a:off x="2505992" y="3361403"/>
+            <a:ext cx="4132015" cy="1868692"/>
           </a:xfrm>
           <a:prstGeom prst="rect">
             <a:avLst/>
@@ -4358,7 +5291,7 @@
     </p:spTree>
     <p:extLst>
       <p:ext uri="{BB962C8B-B14F-4D97-AF65-F5344CB8AC3E}">
-        <p14:creationId xmlns:p14="http://schemas.microsoft.com/office/powerpoint/2010/main" val="3477306886"/>
+        <p14:creationId xmlns:p14="http://schemas.microsoft.com/office/powerpoint/2010/main" val="724258878"/>
       </p:ext>
     </p:extLst>
   </p:cSld>
@@ -4651,4 +5584,299 @@
   <a:objectDefaults/>
   <a:extraClrSchemeLst/>
 </a:theme>
+</file>
+
+<file path=ppt/theme/theme2.xml><?xml version="1.0" encoding="utf-8"?>
+<a:theme xmlns:a="http://schemas.openxmlformats.org/drawingml/2006/main" name="Office Theme">
+  <a:themeElements>
+    <a:clrScheme name="Office">
+      <a:dk1>
+        <a:sysClr val="windowText" lastClr="000000"/>
+      </a:dk1>
+      <a:lt1>
+        <a:sysClr val="window" lastClr="FFFFFF"/>
+      </a:lt1>
+      <a:dk2>
+        <a:srgbClr val="44546A"/>
+      </a:dk2>
+      <a:lt2>
+        <a:srgbClr val="E7E6E6"/>
+      </a:lt2>
+      <a:accent1>
+        <a:srgbClr val="4472C4"/>
+      </a:accent1>
+      <a:accent2>
+        <a:srgbClr val="ED7D31"/>
+      </a:accent2>
+      <a:accent3>
+        <a:srgbClr val="A5A5A5"/>
+      </a:accent3>
+      <a:accent4>
+        <a:srgbClr val="FFC000"/>
+      </a:accent4>
+      <a:accent5>
+        <a:srgbClr val="5B9BD5"/>
+      </a:accent5>
+      <a:accent6>
+        <a:srgbClr val="70AD47"/>
+      </a:accent6>
+      <a:hlink>
+        <a:srgbClr val="0563C1"/>
+      </a:hlink>
+      <a:folHlink>
+        <a:srgbClr val="954F72"/>
+      </a:folHlink>
+    </a:clrScheme>
+    <a:fontScheme name="Office">
+      <a:majorFont>
+        <a:latin typeface="Calibri Light" panose="020F0302020204030204"/>
+        <a:ea typeface=""/>
+        <a:cs typeface=""/>
+        <a:font script="Jpan" typeface="游ゴシック Light"/>
+        <a:font script="Hang" typeface="맑은 고딕"/>
+        <a:font script="Hans" typeface="等线 Light"/>
+        <a:font script="Hant" typeface="新細明體"/>
+        <a:font script="Arab" typeface="Times New Roman"/>
+        <a:font script="Hebr" typeface="Times New Roman"/>
+        <a:font script="Thai" typeface="Angsana New"/>
+        <a:font script="Ethi" typeface="Nyala"/>
+        <a:font script="Beng" typeface="Vrinda"/>
+        <a:font script="Gujr" typeface="Shruti"/>
+        <a:font script="Khmr" typeface="MoolBoran"/>
+        <a:font script="Knda" typeface="Tunga"/>
+        <a:font script="Guru" typeface="Raavi"/>
+        <a:font script="Cans" typeface="Euphemia"/>
+        <a:font script="Cher" typeface="Plantagenet Cherokee"/>
+        <a:font script="Yiii" typeface="Microsoft Yi Baiti"/>
+        <a:font script="Tibt" typeface="Microsoft Himalaya"/>
+        <a:font script="Thaa" typeface="MV Boli"/>
+        <a:font script="Deva" typeface="Mangal"/>
+        <a:font script="Telu" typeface="Gautami"/>
+        <a:font script="Taml" typeface="Latha"/>
+        <a:font script="Syrc" typeface="Estrangelo Edessa"/>
+        <a:font script="Orya" typeface="Kalinga"/>
+        <a:font script="Mlym" typeface="Kartika"/>
+        <a:font script="Laoo" typeface="DokChampa"/>
+        <a:font script="Sinh" typeface="Iskoola Pota"/>
+        <a:font script="Mong" typeface="Mongolian Baiti"/>
+        <a:font script="Viet" typeface="Times New Roman"/>
+        <a:font script="Uigh" typeface="Microsoft Uighur"/>
+        <a:font script="Geor" typeface="Sylfaen"/>
+        <a:font script="Armn" typeface="Arial"/>
+        <a:font script="Bugi" typeface="Leelawadee UI"/>
+        <a:font script="Bopo" typeface="Microsoft JhengHei"/>
+        <a:font script="Java" typeface="Javanese Text"/>
+        <a:font script="Lisu" typeface="Segoe UI"/>
+        <a:font script="Mymr" typeface="Myanmar Text"/>
+        <a:font script="Nkoo" typeface="Ebrima"/>
+        <a:font script="Olck" typeface="Nirmala UI"/>
+        <a:font script="Osma" typeface="Ebrima"/>
+        <a:font script="Phag" typeface="Phagspa"/>
+        <a:font script="Syrn" typeface="Estrangelo Edessa"/>
+        <a:font script="Syrj" typeface="Estrangelo Edessa"/>
+        <a:font script="Syre" typeface="Estrangelo Edessa"/>
+        <a:font script="Sora" typeface="Nirmala UI"/>
+        <a:font script="Tale" typeface="Microsoft Tai Le"/>
+        <a:font script="Talu" typeface="Microsoft New Tai Lue"/>
+        <a:font script="Tfng" typeface="Ebrima"/>
+      </a:majorFont>
+      <a:minorFont>
+        <a:latin typeface="Calibri" panose="020F0502020204030204"/>
+        <a:ea typeface=""/>
+        <a:cs typeface=""/>
+        <a:font script="Jpan" typeface="游ゴシック"/>
+        <a:font script="Hang" typeface="맑은 고딕"/>
+        <a:font script="Hans" typeface="等线"/>
+        <a:font script="Hant" typeface="新細明體"/>
+        <a:font script="Arab" typeface="Arial"/>
+        <a:font script="Hebr" typeface="Arial"/>
+        <a:font script="Thai" typeface="Cordia New"/>
+        <a:font script="Ethi" typeface="Nyala"/>
+        <a:font script="Beng" typeface="Vrinda"/>
+        <a:font script="Gujr" typeface="Shruti"/>
+        <a:font script="Khmr" typeface="DaunPenh"/>
+        <a:font script="Knda" typeface="Tunga"/>
+        <a:font script="Guru" typeface="Raavi"/>
+        <a:font script="Cans" typeface="Euphemia"/>
+        <a:font script="Cher" typeface="Plantagenet Cherokee"/>
+        <a:font script="Yiii" typeface="Microsoft Yi Baiti"/>
+        <a:font script="Tibt" typeface="Microsoft Himalaya"/>
+        <a:font script="Thaa" typeface="MV Boli"/>
+        <a:font script="Deva" typeface="Mangal"/>
+        <a:font script="Telu" typeface="Gautami"/>
+        <a:font script="Taml" typeface="Latha"/>
+        <a:font script="Syrc" typeface="Estrangelo Edessa"/>
+        <a:font script="Orya" typeface="Kalinga"/>
+        <a:font script="Mlym" typeface="Kartika"/>
+        <a:font script="Laoo" typeface="DokChampa"/>
+        <a:font script="Sinh" typeface="Iskoola Pota"/>
+        <a:font script="Mong" typeface="Mongolian Baiti"/>
+        <a:font script="Viet" typeface="Arial"/>
+        <a:font script="Uigh" typeface="Microsoft Uighur"/>
+        <a:font script="Geor" typeface="Sylfaen"/>
+        <a:font script="Armn" typeface="Arial"/>
+        <a:font script="Bugi" typeface="Leelawadee UI"/>
+        <a:font script="Bopo" typeface="Microsoft JhengHei"/>
+        <a:font script="Java" typeface="Javanese Text"/>
+        <a:font script="Lisu" typeface="Segoe UI"/>
+        <a:font script="Mymr" typeface="Myanmar Text"/>
+        <a:font script="Nkoo" typeface="Ebrima"/>
+        <a:font script="Olck" typeface="Nirmala UI"/>
+        <a:font script="Osma" typeface="Ebrima"/>
+        <a:font script="Phag" typeface="Phagspa"/>
+        <a:font script="Syrn" typeface="Estrangelo Edessa"/>
+        <a:font script="Syrj" typeface="Estrangelo Edessa"/>
+        <a:font script="Syre" typeface="Estrangelo Edessa"/>
+        <a:font script="Sora" typeface="Nirmala UI"/>
+        <a:font script="Tale" typeface="Microsoft Tai Le"/>
+        <a:font script="Talu" typeface="Microsoft New Tai Lue"/>
+        <a:font script="Tfng" typeface="Ebrima"/>
+      </a:minorFont>
+    </a:fontScheme>
+    <a:fmtScheme name="Office">
+      <a:fillStyleLst>
+        <a:solidFill>
+          <a:schemeClr val="phClr"/>
+        </a:solidFill>
+        <a:gradFill rotWithShape="1">
+          <a:gsLst>
+            <a:gs pos="0">
+              <a:schemeClr val="phClr">
+                <a:lumMod val="110000"/>
+                <a:satMod val="105000"/>
+                <a:tint val="67000"/>
+              </a:schemeClr>
+            </a:gs>
+            <a:gs pos="50000">
+              <a:schemeClr val="phClr">
+                <a:lumMod val="105000"/>
+                <a:satMod val="103000"/>
+                <a:tint val="73000"/>
+              </a:schemeClr>
+            </a:gs>
+            <a:gs pos="100000">
+              <a:schemeClr val="phClr">
+                <a:lumMod val="105000"/>
+                <a:satMod val="109000"/>
+                <a:tint val="81000"/>
+              </a:schemeClr>
+            </a:gs>
+          </a:gsLst>
+          <a:lin ang="5400000" scaled="0"/>
+        </a:gradFill>
+        <a:gradFill rotWithShape="1">
+          <a:gsLst>
+            <a:gs pos="0">
+              <a:schemeClr val="phClr">
+                <a:satMod val="103000"/>
+                <a:lumMod val="102000"/>
+                <a:tint val="94000"/>
+              </a:schemeClr>
+            </a:gs>
+            <a:gs pos="50000">
+              <a:schemeClr val="phClr">
+                <a:satMod val="110000"/>
+                <a:lumMod val="100000"/>
+                <a:shade val="100000"/>
+              </a:schemeClr>
+            </a:gs>
+            <a:gs pos="100000">
+              <a:schemeClr val="phClr">
+                <a:lumMod val="99000"/>
+                <a:satMod val="120000"/>
+                <a:shade val="78000"/>
+              </a:schemeClr>
+            </a:gs>
+          </a:gsLst>
+          <a:lin ang="5400000" scaled="0"/>
+        </a:gradFill>
+      </a:fillStyleLst>
+      <a:lnStyleLst>
+        <a:ln w="6350" cap="flat" cmpd="sng" algn="ctr">
+          <a:solidFill>
+            <a:schemeClr val="phClr"/>
+          </a:solidFill>
+          <a:prstDash val="solid"/>
+          <a:miter lim="800000"/>
+        </a:ln>
+        <a:ln w="12700" cap="flat" cmpd="sng" algn="ctr">
+          <a:solidFill>
+            <a:schemeClr val="phClr"/>
+          </a:solidFill>
+          <a:prstDash val="solid"/>
+          <a:miter lim="800000"/>
+        </a:ln>
+        <a:ln w="19050" cap="flat" cmpd="sng" algn="ctr">
+          <a:solidFill>
+            <a:schemeClr val="phClr"/>
+          </a:solidFill>
+          <a:prstDash val="solid"/>
+          <a:miter lim="800000"/>
+        </a:ln>
+      </a:lnStyleLst>
+      <a:effectStyleLst>
+        <a:effectStyle>
+          <a:effectLst/>
+        </a:effectStyle>
+        <a:effectStyle>
+          <a:effectLst/>
+        </a:effectStyle>
+        <a:effectStyle>
+          <a:effectLst>
+            <a:outerShdw blurRad="57150" dist="19050" dir="5400000" algn="ctr" rotWithShape="0">
+              <a:srgbClr val="000000">
+                <a:alpha val="63000"/>
+              </a:srgbClr>
+            </a:outerShdw>
+          </a:effectLst>
+        </a:effectStyle>
+      </a:effectStyleLst>
+      <a:bgFillStyleLst>
+        <a:solidFill>
+          <a:schemeClr val="phClr"/>
+        </a:solidFill>
+        <a:solidFill>
+          <a:schemeClr val="phClr">
+            <a:tint val="95000"/>
+            <a:satMod val="170000"/>
+          </a:schemeClr>
+        </a:solidFill>
+        <a:gradFill rotWithShape="1">
+          <a:gsLst>
+            <a:gs pos="0">
+              <a:schemeClr val="phClr">
+                <a:tint val="93000"/>
+                <a:satMod val="150000"/>
+                <a:shade val="98000"/>
+                <a:lumMod val="102000"/>
+              </a:schemeClr>
+            </a:gs>
+            <a:gs pos="50000">
+              <a:schemeClr val="phClr">
+                <a:tint val="98000"/>
+                <a:satMod val="130000"/>
+                <a:shade val="90000"/>
+                <a:lumMod val="103000"/>
+              </a:schemeClr>
+            </a:gs>
+            <a:gs pos="100000">
+              <a:schemeClr val="phClr">
+                <a:shade val="63000"/>
+                <a:satMod val="120000"/>
+              </a:schemeClr>
+            </a:gs>
+          </a:gsLst>
+          <a:lin ang="5400000" scaled="0"/>
+        </a:gradFill>
+      </a:bgFillStyleLst>
+    </a:fmtScheme>
+  </a:themeElements>
+  <a:objectDefaults/>
+  <a:extraClrSchemeLst/>
+  <a:extLst>
+    <a:ext uri="{05A4C25C-085E-4340-85A3-A5531E510DB2}">
+      <thm15:themeFamily xmlns:thm15="http://schemas.microsoft.com/office/thememl/2012/main" name="Office Theme" id="{62F939B6-93AF-4DB8-9C6B-D6C7DFDC589F}" vid="{4A3C46E8-61CC-4603-A589-7422A47A8E4A}"/>
+    </a:ext>
+  </a:extLst>
+</a:theme>
 </file>
</xml_diff>

<commit_message>
update power point slide
</commit_message>
<xml_diff>
--- a/presentation/DS6306_Proj1_Presentation.pptx
+++ b/presentation/DS6306_Proj1_Presentation.pptx
@@ -216,7 +216,7 @@
           <a:p>
             <a:fld id="{05A716D1-0E3B-43FE-813B-2DAFF8230A94}" type="datetimeFigureOut">
               <a:rPr lang="en-US" smtClean="0"/>
-              <a:t>10/19/2019</a:t>
+              <a:t>10/21/2019</a:t>
             </a:fld>
             <a:endParaRPr lang="en-US"/>
           </a:p>
@@ -4301,38 +4301,6 @@
           </a:p>
         </p:txBody>
       </p:sp>
-      <p:pic>
-        <p:nvPicPr>
-          <p:cNvPr id="4" name="Content Placeholder 3">
-            <a:extLst>
-              <a:ext uri="{FF2B5EF4-FFF2-40B4-BE49-F238E27FC236}">
-                <a16:creationId xmlns:a16="http://schemas.microsoft.com/office/drawing/2014/main" id="{10F62500-2244-4E96-8E46-BE3BC8392297}"/>
-              </a:ext>
-            </a:extLst>
-          </p:cNvPr>
-          <p:cNvPicPr>
-            <a:picLocks noGrp="1" noChangeAspect="1"/>
-          </p:cNvPicPr>
-          <p:nvPr>
-            <p:ph idx="1"/>
-          </p:nvPr>
-        </p:nvPicPr>
-        <p:blipFill>
-          <a:blip r:embed="rId2"/>
-          <a:stretch>
-            <a:fillRect/>
-          </a:stretch>
-        </p:blipFill>
-        <p:spPr>
-          <a:xfrm>
-            <a:off x="2495857" y="3777585"/>
-            <a:ext cx="4476750" cy="1628775"/>
-          </a:xfrm>
-          <a:prstGeom prst="rect">
-            <a:avLst/>
-          </a:prstGeom>
-        </p:spPr>
-      </p:pic>
       <p:sp>
         <p:nvSpPr>
           <p:cNvPr id="8" name="Content Placeholder 4">
@@ -4500,7 +4468,31 @@
           <a:p>
             <a:r>
               <a:rPr lang="en-US" dirty="0"/>
-              <a:t>The ABV (Alcohol by Volume) and IBU (International Bitterness Unit) columns have missing values</a:t>
+              <a:t>The </a:t>
+            </a:r>
+            <a:r>
+              <a:rPr lang="en-US" b="1" dirty="0"/>
+              <a:t>ABV</a:t>
+            </a:r>
+            <a:r>
+              <a:rPr lang="en-US" dirty="0"/>
+              <a:t> (Alcohol by Volume), </a:t>
+            </a:r>
+            <a:r>
+              <a:rPr lang="en-US" b="1" dirty="0"/>
+              <a:t>IBU</a:t>
+            </a:r>
+            <a:r>
+              <a:rPr lang="en-US" dirty="0"/>
+              <a:t> (International Bitterness Unit) and </a:t>
+            </a:r>
+            <a:r>
+              <a:rPr lang="en-US" b="1" dirty="0"/>
+              <a:t>Style</a:t>
+            </a:r>
+            <a:r>
+              <a:rPr lang="en-US" dirty="0"/>
+              <a:t> columns have missing values</a:t>
             </a:r>
           </a:p>
           <a:p>
@@ -4536,15 +4528,15 @@
         </p:nvSpPr>
         <p:spPr>
           <a:xfrm>
-            <a:off x="2448232" y="5467187"/>
-            <a:ext cx="4572000" cy="923330"/>
+            <a:off x="2262187" y="5698432"/>
+            <a:ext cx="4758045" cy="646331"/>
           </a:xfrm>
           <a:prstGeom prst="rect">
             <a:avLst/>
           </a:prstGeom>
         </p:spPr>
         <p:txBody>
-          <a:bodyPr>
+          <a:bodyPr wrap="square">
             <a:spAutoFit/>
           </a:bodyPr>
           <a:lstStyle/>
@@ -4556,6 +4548,36 @@
           </a:p>
         </p:txBody>
       </p:sp>
+      <p:pic>
+        <p:nvPicPr>
+          <p:cNvPr id="12" name="Picture 11">
+            <a:extLst>
+              <a:ext uri="{FF2B5EF4-FFF2-40B4-BE49-F238E27FC236}">
+                <a16:creationId xmlns:a16="http://schemas.microsoft.com/office/drawing/2014/main" id="{4D51165C-558B-4457-8486-EF1ECAA4454E}"/>
+              </a:ext>
+            </a:extLst>
+          </p:cNvPr>
+          <p:cNvPicPr>
+            <a:picLocks noChangeAspect="1"/>
+          </p:cNvPicPr>
+          <p:nvPr/>
+        </p:nvPicPr>
+        <p:blipFill>
+          <a:blip r:embed="rId2"/>
+          <a:stretch>
+            <a:fillRect/>
+          </a:stretch>
+        </p:blipFill>
+        <p:spPr>
+          <a:xfrm>
+            <a:off x="2262187" y="3412432"/>
+            <a:ext cx="4619625" cy="2286000"/>
+          </a:xfrm>
+          <a:prstGeom prst="rect">
+            <a:avLst/>
+          </a:prstGeom>
+        </p:spPr>
+      </p:pic>
     </p:spTree>
     <p:extLst>
       <p:ext uri="{BB962C8B-B14F-4D97-AF65-F5344CB8AC3E}">

</xml_diff>